<commit_message>
fixed 04 guided practice
</commit_message>
<xml_diff>
--- a/04 React Routing, Component Lifecycle Methods.pptx
+++ b/04 React Routing, Component Lifecycle Methods.pptx
@@ -5,7 +5,7 @@
     <p:sldMasterId id="2147483648" r:id="rId1"/>
   </p:sldMasterIdLst>
   <p:notesMasterIdLst>
-    <p:notesMasterId r:id="rId50"/>
+    <p:notesMasterId r:id="rId49"/>
   </p:notesMasterIdLst>
   <p:sldIdLst>
     <p:sldId id="272" r:id="rId2"/>
@@ -29,33 +29,32 @@
     <p:sldId id="432" r:id="rId20"/>
     <p:sldId id="435" r:id="rId21"/>
     <p:sldId id="440" r:id="rId22"/>
-    <p:sldId id="423" r:id="rId23"/>
-    <p:sldId id="433" r:id="rId24"/>
-    <p:sldId id="364" r:id="rId25"/>
-    <p:sldId id="365" r:id="rId26"/>
-    <p:sldId id="295" r:id="rId27"/>
-    <p:sldId id="363" r:id="rId28"/>
-    <p:sldId id="359" r:id="rId29"/>
-    <p:sldId id="358" r:id="rId30"/>
-    <p:sldId id="361" r:id="rId31"/>
-    <p:sldId id="362" r:id="rId32"/>
-    <p:sldId id="360" r:id="rId33"/>
-    <p:sldId id="296" r:id="rId34"/>
-    <p:sldId id="297" r:id="rId35"/>
-    <p:sldId id="437" r:id="rId36"/>
-    <p:sldId id="438" r:id="rId37"/>
-    <p:sldId id="439" r:id="rId38"/>
-    <p:sldId id="441" r:id="rId39"/>
-    <p:sldId id="442" r:id="rId40"/>
-    <p:sldId id="443" r:id="rId41"/>
-    <p:sldId id="271" r:id="rId42"/>
-    <p:sldId id="401" r:id="rId43"/>
-    <p:sldId id="394" r:id="rId44"/>
-    <p:sldId id="395" r:id="rId45"/>
-    <p:sldId id="328" r:id="rId46"/>
-    <p:sldId id="431" r:id="rId47"/>
-    <p:sldId id="267" r:id="rId48"/>
-    <p:sldId id="268" r:id="rId49"/>
+    <p:sldId id="433" r:id="rId23"/>
+    <p:sldId id="364" r:id="rId24"/>
+    <p:sldId id="365" r:id="rId25"/>
+    <p:sldId id="295" r:id="rId26"/>
+    <p:sldId id="363" r:id="rId27"/>
+    <p:sldId id="359" r:id="rId28"/>
+    <p:sldId id="358" r:id="rId29"/>
+    <p:sldId id="361" r:id="rId30"/>
+    <p:sldId id="362" r:id="rId31"/>
+    <p:sldId id="360" r:id="rId32"/>
+    <p:sldId id="296" r:id="rId33"/>
+    <p:sldId id="297" r:id="rId34"/>
+    <p:sldId id="437" r:id="rId35"/>
+    <p:sldId id="438" r:id="rId36"/>
+    <p:sldId id="439" r:id="rId37"/>
+    <p:sldId id="441" r:id="rId38"/>
+    <p:sldId id="442" r:id="rId39"/>
+    <p:sldId id="443" r:id="rId40"/>
+    <p:sldId id="271" r:id="rId41"/>
+    <p:sldId id="401" r:id="rId42"/>
+    <p:sldId id="394" r:id="rId43"/>
+    <p:sldId id="395" r:id="rId44"/>
+    <p:sldId id="328" r:id="rId45"/>
+    <p:sldId id="431" r:id="rId46"/>
+    <p:sldId id="267" r:id="rId47"/>
+    <p:sldId id="268" r:id="rId48"/>
   </p:sldIdLst>
   <p:sldSz cx="12192000" cy="6858000"/>
   <p:notesSz cx="6858000" cy="9144000"/>
@@ -999,7 +998,7 @@
           <a:p>
             <a:fld id="{53FFCFF5-268C-450A-90CA-A9303B69089F}" type="slidenum">
               <a:rPr lang="en-US" smtClean="0"/>
-              <a:t>23</a:t>
+              <a:t>22</a:t>
             </a:fld>
             <a:endParaRPr lang="en-US"/>
           </a:p>
@@ -1083,7 +1082,7 @@
           <a:p>
             <a:fld id="{53FFCFF5-268C-450A-90CA-A9303B69089F}" type="slidenum">
               <a:rPr lang="en-US" smtClean="0"/>
-              <a:t>24</a:t>
+              <a:t>23</a:t>
             </a:fld>
             <a:endParaRPr lang="en-US"/>
           </a:p>
@@ -1167,7 +1166,7 @@
           <a:p>
             <a:fld id="{53FFCFF5-268C-450A-90CA-A9303B69089F}" type="slidenum">
               <a:rPr lang="en-US" smtClean="0"/>
-              <a:t>25</a:t>
+              <a:t>24</a:t>
             </a:fld>
             <a:endParaRPr lang="en-US"/>
           </a:p>
@@ -1251,7 +1250,7 @@
           <a:p>
             <a:fld id="{53FFCFF5-268C-450A-90CA-A9303B69089F}" type="slidenum">
               <a:rPr lang="en-US" smtClean="0"/>
-              <a:t>26</a:t>
+              <a:t>25</a:t>
             </a:fld>
             <a:endParaRPr lang="en-US"/>
           </a:p>
@@ -1335,7 +1334,7 @@
           <a:p>
             <a:fld id="{53FFCFF5-268C-450A-90CA-A9303B69089F}" type="slidenum">
               <a:rPr lang="en-US" smtClean="0"/>
-              <a:t>27</a:t>
+              <a:t>26</a:t>
             </a:fld>
             <a:endParaRPr lang="en-US"/>
           </a:p>
@@ -1419,7 +1418,7 @@
           <a:p>
             <a:fld id="{53FFCFF5-268C-450A-90CA-A9303B69089F}" type="slidenum">
               <a:rPr lang="en-US" smtClean="0"/>
-              <a:t>28</a:t>
+              <a:t>27</a:t>
             </a:fld>
             <a:endParaRPr lang="en-US"/>
           </a:p>
@@ -1587,7 +1586,7 @@
           <a:p>
             <a:fld id="{53FFCFF5-268C-450A-90CA-A9303B69089F}" type="slidenum">
               <a:rPr lang="en-US" smtClean="0"/>
-              <a:t>29</a:t>
+              <a:t>28</a:t>
             </a:fld>
             <a:endParaRPr lang="en-US"/>
           </a:p>
@@ -1671,7 +1670,7 @@
           <a:p>
             <a:fld id="{53FFCFF5-268C-450A-90CA-A9303B69089F}" type="slidenum">
               <a:rPr lang="en-US" smtClean="0"/>
-              <a:t>30</a:t>
+              <a:t>29</a:t>
             </a:fld>
             <a:endParaRPr lang="en-US"/>
           </a:p>
@@ -1755,7 +1754,7 @@
           <a:p>
             <a:fld id="{53FFCFF5-268C-450A-90CA-A9303B69089F}" type="slidenum">
               <a:rPr lang="en-US" smtClean="0"/>
-              <a:t>31</a:t>
+              <a:t>30</a:t>
             </a:fld>
             <a:endParaRPr lang="en-US"/>
           </a:p>
@@ -1839,7 +1838,7 @@
           <a:p>
             <a:fld id="{53FFCFF5-268C-450A-90CA-A9303B69089F}" type="slidenum">
               <a:rPr lang="en-US" smtClean="0"/>
-              <a:t>32</a:t>
+              <a:t>31</a:t>
             </a:fld>
             <a:endParaRPr lang="en-US"/>
           </a:p>
@@ -1923,7 +1922,7 @@
           <a:p>
             <a:fld id="{53FFCFF5-268C-450A-90CA-A9303B69089F}" type="slidenum">
               <a:rPr lang="en-US" smtClean="0"/>
-              <a:t>33</a:t>
+              <a:t>32</a:t>
             </a:fld>
             <a:endParaRPr lang="en-US"/>
           </a:p>
@@ -2007,7 +2006,7 @@
           <a:p>
             <a:fld id="{53FFCFF5-268C-450A-90CA-A9303B69089F}" type="slidenum">
               <a:rPr lang="en-US" smtClean="0"/>
-              <a:t>34</a:t>
+              <a:t>33</a:t>
             </a:fld>
             <a:endParaRPr lang="en-US"/>
           </a:p>
@@ -2091,7 +2090,7 @@
           <a:p>
             <a:fld id="{53FFCFF5-268C-450A-90CA-A9303B69089F}" type="slidenum">
               <a:rPr lang="en-US" smtClean="0"/>
-              <a:t>35</a:t>
+              <a:t>34</a:t>
             </a:fld>
             <a:endParaRPr lang="en-US"/>
           </a:p>
@@ -2175,7 +2174,7 @@
           <a:p>
             <a:fld id="{53FFCFF5-268C-450A-90CA-A9303B69089F}" type="slidenum">
               <a:rPr lang="en-US" smtClean="0"/>
-              <a:t>42</a:t>
+              <a:t>41</a:t>
             </a:fld>
             <a:endParaRPr lang="en-US" dirty="0"/>
           </a:p>
@@ -2259,7 +2258,7 @@
           <a:p>
             <a:fld id="{53FFCFF5-268C-450A-90CA-A9303B69089F}" type="slidenum">
               <a:rPr lang="en-US" smtClean="0"/>
-              <a:t>43</a:t>
+              <a:t>42</a:t>
             </a:fld>
             <a:endParaRPr lang="en-US" dirty="0"/>
           </a:p>
@@ -2343,7 +2342,7 @@
           <a:p>
             <a:fld id="{53FFCFF5-268C-450A-90CA-A9303B69089F}" type="slidenum">
               <a:rPr lang="en-US" smtClean="0"/>
-              <a:t>44</a:t>
+              <a:t>43</a:t>
             </a:fld>
             <a:endParaRPr lang="en-US" dirty="0"/>
           </a:p>
@@ -2511,7 +2510,7 @@
           <a:p>
             <a:fld id="{53FFCFF5-268C-450A-90CA-A9303B69089F}" type="slidenum">
               <a:rPr lang="en-US" smtClean="0"/>
-              <a:t>46</a:t>
+              <a:t>45</a:t>
             </a:fld>
             <a:endParaRPr lang="en-US"/>
           </a:p>
@@ -2595,7 +2594,7 @@
           <a:p>
             <a:fld id="{53FFCFF5-268C-450A-90CA-A9303B69089F}" type="slidenum">
               <a:rPr lang="en-US" smtClean="0"/>
-              <a:t>48</a:t>
+              <a:t>47</a:t>
             </a:fld>
             <a:endParaRPr lang="en-US"/>
           </a:p>
@@ -13217,46 +13216,6 @@
           <a:lstStyle/>
           <a:p>
             <a:pPr marL="742950" indent="-742950">
-              <a:buAutoNum type="arabicPeriod"/>
-            </a:pPr>
-            <a:r>
-              <a:rPr lang="en-US" sz="2800" dirty="0">
-                <a:latin typeface="Arial" panose="020B0604020202020204" pitchFamily="34" charset="0"/>
-                <a:cs typeface="Arial" panose="020B0604020202020204" pitchFamily="34" charset="0"/>
-              </a:rPr>
-              <a:t>Add history to </a:t>
-            </a:r>
-            <a:r>
-              <a:rPr lang="en-US" sz="2800" dirty="0" err="1">
-                <a:latin typeface="Arial" panose="020B0604020202020204" pitchFamily="34" charset="0"/>
-                <a:cs typeface="Arial" panose="020B0604020202020204" pitchFamily="34" charset="0"/>
-              </a:rPr>
-              <a:t>App.js</a:t>
-            </a:r>
-            <a:r>
-              <a:rPr lang="en-US" sz="2800" dirty="0">
-                <a:latin typeface="Arial" panose="020B0604020202020204" pitchFamily="34" charset="0"/>
-                <a:cs typeface="Arial" panose="020B0604020202020204" pitchFamily="34" charset="0"/>
-              </a:rPr>
-              <a:t> and pass it as a prop to </a:t>
-            </a:r>
-            <a:r>
-              <a:rPr lang="en-US" sz="2800" dirty="0" err="1">
-                <a:latin typeface="Arial" panose="020B0604020202020204" pitchFamily="34" charset="0"/>
-                <a:cs typeface="Arial" panose="020B0604020202020204" pitchFamily="34" charset="0"/>
-              </a:rPr>
-              <a:t>AddDeveloper</a:t>
-            </a:r>
-            <a:endParaRPr lang="en-US" sz="2800" dirty="0">
-              <a:solidFill>
-                <a:schemeClr val="bg1"/>
-              </a:solidFill>
-              <a:latin typeface="Arial" panose="020B0604020202020204" pitchFamily="34" charset="0"/>
-              <a:cs typeface="Arial" panose="020B0604020202020204" pitchFamily="34" charset="0"/>
-            </a:endParaRPr>
-          </a:p>
-          <a:p>
-            <a:pPr marL="742950" indent="-742950">
               <a:buFont typeface="Arial" panose="020B0604020202020204" pitchFamily="34" charset="0"/>
               <a:buAutoNum type="arabicPeriod"/>
             </a:pPr>
@@ -13427,67 +13386,6 @@
                       </p:childTnLst>
                     </p:cTn>
                   </p:par>
-                  <p:par>
-                    <p:cTn id="8" fill="hold">
-                      <p:stCondLst>
-                        <p:cond delay="indefinite"/>
-                      </p:stCondLst>
-                      <p:childTnLst>
-                        <p:par>
-                          <p:cTn id="9" fill="hold">
-                            <p:stCondLst>
-                              <p:cond delay="0"/>
-                            </p:stCondLst>
-                            <p:childTnLst>
-                              <p:par>
-                                <p:cTn id="10" presetID="9" presetClass="entr" presetSubtype="0" fill="hold" grpId="0" nodeType="clickEffect">
-                                  <p:stCondLst>
-                                    <p:cond delay="0"/>
-                                  </p:stCondLst>
-                                  <p:childTnLst>
-                                    <p:set>
-                                      <p:cBhvr>
-                                        <p:cTn id="11" dur="1" fill="hold">
-                                          <p:stCondLst>
-                                            <p:cond delay="0"/>
-                                          </p:stCondLst>
-                                        </p:cTn>
-                                        <p:tgtEl>
-                                          <p:spTgt spid="3">
-                                            <p:txEl>
-                                              <p:pRg st="1" end="1"/>
-                                            </p:txEl>
-                                          </p:spTgt>
-                                        </p:tgtEl>
-                                        <p:attrNameLst>
-                                          <p:attrName>style.visibility</p:attrName>
-                                        </p:attrNameLst>
-                                      </p:cBhvr>
-                                      <p:to>
-                                        <p:strVal val="visible"/>
-                                      </p:to>
-                                    </p:set>
-                                    <p:animEffect transition="in" filter="dissolve">
-                                      <p:cBhvr>
-                                        <p:cTn id="12" dur="500"/>
-                                        <p:tgtEl>
-                                          <p:spTgt spid="3">
-                                            <p:txEl>
-                                              <p:pRg st="1" end="1"/>
-                                            </p:txEl>
-                                          </p:spTgt>
-                                        </p:tgtEl>
-                                      </p:cBhvr>
-                                    </p:animEffect>
-                                  </p:childTnLst>
-                                </p:cTn>
-                              </p:par>
-                            </p:childTnLst>
-                          </p:cTn>
-                        </p:par>
-                      </p:childTnLst>
-                    </p:cTn>
-                  </p:par>
                 </p:childTnLst>
               </p:cTn>
               <p:prevCondLst>
@@ -13517,131 +13415,6 @@
 </file>
 
 <file path=ppt/slides/slide22.xml><?xml version="1.0" encoding="utf-8"?>
-<p:sld xmlns:a="http://schemas.openxmlformats.org/drawingml/2006/main" xmlns:r="http://schemas.openxmlformats.org/officeDocument/2006/relationships" xmlns:p="http://schemas.openxmlformats.org/presentationml/2006/main">
-  <p:cSld>
-    <p:spTree>
-      <p:nvGrpSpPr>
-        <p:cNvPr id="1" name=""/>
-        <p:cNvGrpSpPr/>
-        <p:nvPr/>
-      </p:nvGrpSpPr>
-      <p:grpSpPr>
-        <a:xfrm>
-          <a:off x="0" y="0"/>
-          <a:ext cx="0" cy="0"/>
-          <a:chOff x="0" y="0"/>
-          <a:chExt cx="0" cy="0"/>
-        </a:xfrm>
-      </p:grpSpPr>
-      <p:sp>
-        <p:nvSpPr>
-          <p:cNvPr id="2" name="Title 1">
-            <a:extLst>
-              <a:ext uri="{FF2B5EF4-FFF2-40B4-BE49-F238E27FC236}">
-                <a16:creationId xmlns:a16="http://schemas.microsoft.com/office/drawing/2014/main" id="{2D0DBDDA-5B1E-5441-B24A-BEBE90DE3CA7}"/>
-              </a:ext>
-            </a:extLst>
-          </p:cNvPr>
-          <p:cNvSpPr>
-            <a:spLocks noGrp="1"/>
-          </p:cNvSpPr>
-          <p:nvPr>
-            <p:ph type="title"/>
-          </p:nvPr>
-        </p:nvSpPr>
-        <p:spPr>
-          <a:xfrm>
-            <a:off x="2322441" y="966462"/>
-            <a:ext cx="1517753" cy="607259"/>
-          </a:xfrm>
-        </p:spPr>
-        <p:txBody>
-          <a:bodyPr/>
-          <a:lstStyle/>
-          <a:p>
-            <a:pPr algn="ctr"/>
-            <a:r>
-              <a:rPr lang="en-US" dirty="0" err="1"/>
-              <a:t>App.js</a:t>
-            </a:r>
-            <a:endParaRPr lang="en-US" dirty="0"/>
-          </a:p>
-        </p:txBody>
-      </p:sp>
-      <p:pic>
-        <p:nvPicPr>
-          <p:cNvPr id="5" name="Picture 4">
-            <a:extLst>
-              <a:ext uri="{FF2B5EF4-FFF2-40B4-BE49-F238E27FC236}">
-                <a16:creationId xmlns:a16="http://schemas.microsoft.com/office/drawing/2014/main" id="{89D87D05-817F-6649-A32B-60F7F3B105BD}"/>
-              </a:ext>
-            </a:extLst>
-          </p:cNvPr>
-          <p:cNvPicPr>
-            <a:picLocks noChangeAspect="1"/>
-          </p:cNvPicPr>
-          <p:nvPr/>
-        </p:nvPicPr>
-        <p:blipFill>
-          <a:blip r:embed="rId2"/>
-          <a:stretch>
-            <a:fillRect/>
-          </a:stretch>
-        </p:blipFill>
-        <p:spPr>
-          <a:xfrm>
-            <a:off x="0" y="3048682"/>
-            <a:ext cx="12192000" cy="3809318"/>
-          </a:xfrm>
-          <a:prstGeom prst="rect">
-            <a:avLst/>
-          </a:prstGeom>
-        </p:spPr>
-      </p:pic>
-      <p:pic>
-        <p:nvPicPr>
-          <p:cNvPr id="8" name="Picture 7">
-            <a:extLst>
-              <a:ext uri="{FF2B5EF4-FFF2-40B4-BE49-F238E27FC236}">
-                <a16:creationId xmlns:a16="http://schemas.microsoft.com/office/drawing/2014/main" id="{A03D1C1D-6A07-B044-AAED-51E9BFD13B82}"/>
-              </a:ext>
-            </a:extLst>
-          </p:cNvPr>
-          <p:cNvPicPr>
-            <a:picLocks noChangeAspect="1"/>
-          </p:cNvPicPr>
-          <p:nvPr/>
-        </p:nvPicPr>
-        <p:blipFill>
-          <a:blip r:embed="rId3"/>
-          <a:stretch>
-            <a:fillRect/>
-          </a:stretch>
-        </p:blipFill>
-        <p:spPr>
-          <a:xfrm>
-            <a:off x="4603209" y="659319"/>
-            <a:ext cx="5981700" cy="1473200"/>
-          </a:xfrm>
-          <a:prstGeom prst="rect">
-            <a:avLst/>
-          </a:prstGeom>
-        </p:spPr>
-      </p:pic>
-    </p:spTree>
-    <p:extLst>
-      <p:ext uri="{BB962C8B-B14F-4D97-AF65-F5344CB8AC3E}">
-        <p14:creationId xmlns:p14="http://schemas.microsoft.com/office/powerpoint/2010/main" val="2907750080"/>
-      </p:ext>
-    </p:extLst>
-  </p:cSld>
-  <p:clrMapOvr>
-    <a:masterClrMapping/>
-  </p:clrMapOvr>
-</p:sld>
-</file>
-
-<file path=ppt/slides/slide23.xml><?xml version="1.0" encoding="utf-8"?>
 <p:sld xmlns:a="http://schemas.openxmlformats.org/drawingml/2006/main" xmlns:r="http://schemas.openxmlformats.org/officeDocument/2006/relationships" xmlns:p="http://schemas.openxmlformats.org/presentationml/2006/main">
   <p:cSld>
     <p:spTree>
@@ -13790,7 +13563,7 @@
 </p:sld>
 </file>
 
-<file path=ppt/slides/slide24.xml><?xml version="1.0" encoding="utf-8"?>
+<file path=ppt/slides/slide23.xml><?xml version="1.0" encoding="utf-8"?>
 <p:sld xmlns:a="http://schemas.openxmlformats.org/drawingml/2006/main" xmlns:r="http://schemas.openxmlformats.org/officeDocument/2006/relationships" xmlns:p="http://schemas.openxmlformats.org/presentationml/2006/main">
   <p:cSld>
     <p:spTree>
@@ -13859,7 +13632,7 @@
 </p:sld>
 </file>
 
-<file path=ppt/slides/slide25.xml><?xml version="1.0" encoding="utf-8"?>
+<file path=ppt/slides/slide24.xml><?xml version="1.0" encoding="utf-8"?>
 <p:sld xmlns:a="http://schemas.openxmlformats.org/drawingml/2006/main" xmlns:r="http://schemas.openxmlformats.org/officeDocument/2006/relationships" xmlns:p="http://schemas.openxmlformats.org/presentationml/2006/main">
   <p:cSld>
     <p:spTree>
@@ -14091,7 +13864,7 @@
 </p:sld>
 </file>
 
-<file path=ppt/slides/slide26.xml><?xml version="1.0" encoding="utf-8"?>
+<file path=ppt/slides/slide25.xml><?xml version="1.0" encoding="utf-8"?>
 <p:sld xmlns:a="http://schemas.openxmlformats.org/drawingml/2006/main" xmlns:r="http://schemas.openxmlformats.org/officeDocument/2006/relationships" xmlns:p="http://schemas.openxmlformats.org/presentationml/2006/main">
   <p:cSld>
     <p:spTree>
@@ -14358,7 +14131,7 @@
 </p:sld>
 </file>
 
-<file path=ppt/slides/slide27.xml><?xml version="1.0" encoding="utf-8"?>
+<file path=ppt/slides/slide26.xml><?xml version="1.0" encoding="utf-8"?>
 <p:sld xmlns:a="http://schemas.openxmlformats.org/drawingml/2006/main" xmlns:r="http://schemas.openxmlformats.org/officeDocument/2006/relationships" xmlns:p="http://schemas.openxmlformats.org/presentationml/2006/main">
   <p:cSld>
     <p:spTree>
@@ -14912,7 +14685,7 @@
 </p:sld>
 </file>
 
-<file path=ppt/slides/slide28.xml><?xml version="1.0" encoding="utf-8"?>
+<file path=ppt/slides/slide27.xml><?xml version="1.0" encoding="utf-8"?>
 <p:sld xmlns:a="http://schemas.openxmlformats.org/drawingml/2006/main" xmlns:r="http://schemas.openxmlformats.org/officeDocument/2006/relationships" xmlns:p="http://schemas.openxmlformats.org/presentationml/2006/main">
   <p:cSld>
     <p:spTree>
@@ -14972,6 +14745,386 @@
 </p:sld>
 </file>
 
+<file path=ppt/slides/slide28.xml><?xml version="1.0" encoding="utf-8"?>
+<p:sld xmlns:a="http://schemas.openxmlformats.org/drawingml/2006/main" xmlns:r="http://schemas.openxmlformats.org/officeDocument/2006/relationships" xmlns:p="http://schemas.openxmlformats.org/presentationml/2006/main">
+  <p:cSld>
+    <p:spTree>
+      <p:nvGrpSpPr>
+        <p:cNvPr id="1" name=""/>
+        <p:cNvGrpSpPr/>
+        <p:nvPr/>
+      </p:nvGrpSpPr>
+      <p:grpSpPr>
+        <a:xfrm>
+          <a:off x="0" y="0"/>
+          <a:ext cx="0" cy="0"/>
+          <a:chOff x="0" y="0"/>
+          <a:chExt cx="0" cy="0"/>
+        </a:xfrm>
+      </p:grpSpPr>
+      <p:sp>
+        <p:nvSpPr>
+          <p:cNvPr id="21" name="Title 1"/>
+          <p:cNvSpPr txBox="1">
+            <a:spLocks/>
+          </p:cNvSpPr>
+          <p:nvPr/>
+        </p:nvSpPr>
+        <p:spPr>
+          <a:xfrm>
+            <a:off x="474133" y="3835400"/>
+            <a:ext cx="11379200" cy="2336800"/>
+          </a:xfrm>
+          <a:prstGeom prst="rect">
+            <a:avLst/>
+          </a:prstGeom>
+        </p:spPr>
+        <p:txBody>
+          <a:bodyPr/>
+          <a:lstStyle>
+            <a:lvl1pPr algn="l" defTabSz="457200" rtl="0" eaLnBrk="1" latinLnBrk="0" hangingPunct="1">
+              <a:spcBef>
+                <a:spcPct val="0"/>
+              </a:spcBef>
+              <a:buNone/>
+              <a:defRPr sz="2000" b="1" kern="1200" baseline="0">
+                <a:solidFill>
+                  <a:schemeClr val="bg1"/>
+                </a:solidFill>
+                <a:latin typeface="+mj-lt"/>
+                <a:ea typeface="+mj-ea"/>
+                <a:cs typeface="+mj-cs"/>
+              </a:defRPr>
+            </a:lvl1pPr>
+          </a:lstStyle>
+          <a:p>
+            <a:r>
+              <a:rPr lang="en-US" sz="2400" dirty="0">
+                <a:solidFill>
+                  <a:schemeClr val="bg1">
+                    <a:lumMod val="85000"/>
+                  </a:schemeClr>
+                </a:solidFill>
+              </a:rPr>
+              <a:t>ComponentDidMount() </a:t>
+            </a:r>
+            <a:r>
+              <a:rPr lang="en-US" sz="2400" b="0" dirty="0">
+                <a:solidFill>
+                  <a:srgbClr val="C4E3B0"/>
+                </a:solidFill>
+              </a:rPr>
+              <a:t>- Invoked immediately after a component is mounted.</a:t>
+            </a:r>
+          </a:p>
+          <a:p>
+            <a:endParaRPr lang="en-US" sz="2400" b="0" dirty="0">
+              <a:solidFill>
+                <a:srgbClr val="C4E3B0"/>
+              </a:solidFill>
+            </a:endParaRPr>
+          </a:p>
+          <a:p>
+            <a:pPr marL="1066773" lvl="1" indent="-457189">
+              <a:buFont typeface="Arial" panose="020B0604020202020204" pitchFamily="34" charset="0"/>
+              <a:buChar char="•"/>
+            </a:pPr>
+            <a:r>
+              <a:rPr lang="en-US" sz="2400" dirty="0">
+                <a:solidFill>
+                  <a:srgbClr val="C4E3B0"/>
+                </a:solidFill>
+              </a:rPr>
+              <a:t>Initialization that requires DOM nodes should go here.</a:t>
+            </a:r>
+          </a:p>
+          <a:p>
+            <a:pPr marL="1066773" lvl="1" indent="-457189">
+              <a:buFont typeface="Arial" panose="020B0604020202020204" pitchFamily="34" charset="0"/>
+              <a:buChar char="•"/>
+            </a:pPr>
+            <a:r>
+              <a:rPr lang="en-US" sz="2400" dirty="0">
+                <a:solidFill>
+                  <a:srgbClr val="C4E3B0"/>
+                </a:solidFill>
+              </a:rPr>
+              <a:t>Its a good place to set up any subscriptions. If you do that, don’t forget to unsubscribe in </a:t>
+            </a:r>
+            <a:r>
+              <a:rPr lang="en-US" sz="2400" dirty="0" err="1">
+                <a:solidFill>
+                  <a:srgbClr val="C4E3B0"/>
+                </a:solidFill>
+              </a:rPr>
+              <a:t>componentWillUnmount</a:t>
+            </a:r>
+            <a:r>
+              <a:rPr lang="en-US" sz="2400" dirty="0">
+                <a:solidFill>
+                  <a:srgbClr val="C4E3B0"/>
+                </a:solidFill>
+              </a:rPr>
+              <a:t>(). </a:t>
+            </a:r>
+          </a:p>
+          <a:p>
+            <a:endParaRPr lang="en-US" sz="2400" b="0" dirty="0">
+              <a:solidFill>
+                <a:srgbClr val="C4E3B0"/>
+              </a:solidFill>
+            </a:endParaRPr>
+          </a:p>
+          <a:p>
+            <a:br>
+              <a:rPr lang="en-US" sz="2400" dirty="0">
+                <a:solidFill>
+                  <a:srgbClr val="C4E3B0"/>
+                </a:solidFill>
+                <a:latin typeface="+mn-lt"/>
+              </a:rPr>
+            </a:br>
+            <a:endParaRPr lang="en-US" sz="2400" dirty="0">
+              <a:solidFill>
+                <a:srgbClr val="C4E3B0"/>
+              </a:solidFill>
+              <a:latin typeface="+mn-lt"/>
+            </a:endParaRPr>
+          </a:p>
+        </p:txBody>
+      </p:sp>
+      <p:sp>
+        <p:nvSpPr>
+          <p:cNvPr id="22" name="TextBox 21"/>
+          <p:cNvSpPr txBox="1"/>
+          <p:nvPr/>
+        </p:nvSpPr>
+        <p:spPr>
+          <a:xfrm>
+            <a:off x="474133" y="1394699"/>
+            <a:ext cx="10566400" cy="2308324"/>
+          </a:xfrm>
+          <a:prstGeom prst="rect">
+            <a:avLst/>
+          </a:prstGeom>
+          <a:noFill/>
+        </p:spPr>
+        <p:txBody>
+          <a:bodyPr wrap="square" rtlCol="0">
+            <a:spAutoFit/>
+          </a:bodyPr>
+          <a:lstStyle/>
+          <a:p>
+            <a:r>
+              <a:rPr lang="en-US" sz="2400" dirty="0">
+                <a:solidFill>
+                  <a:schemeClr val="bg1">
+                    <a:lumMod val="85000"/>
+                  </a:schemeClr>
+                </a:solidFill>
+              </a:rPr>
+              <a:t> </a:t>
+            </a:r>
+            <a:r>
+              <a:rPr lang="en-US" sz="2400" b="1" dirty="0">
+                <a:solidFill>
+                  <a:schemeClr val="bg1">
+                    <a:lumMod val="85000"/>
+                  </a:schemeClr>
+                </a:solidFill>
+              </a:rPr>
+              <a:t>Constructor</a:t>
+            </a:r>
+            <a:r>
+              <a:rPr lang="en-US" sz="2400" dirty="0">
+                <a:solidFill>
+                  <a:schemeClr val="bg1"/>
+                </a:solidFill>
+              </a:rPr>
+              <a:t> </a:t>
+            </a:r>
+            <a:r>
+              <a:rPr lang="en-US" sz="2400" b="1" dirty="0">
+                <a:solidFill>
+                  <a:schemeClr val="bg1"/>
+                </a:solidFill>
+              </a:rPr>
+              <a:t>-</a:t>
+            </a:r>
+            <a:r>
+              <a:rPr lang="en-US" sz="2400" dirty="0">
+                <a:solidFill>
+                  <a:schemeClr val="bg1"/>
+                </a:solidFill>
+              </a:rPr>
+              <a:t> </a:t>
+            </a:r>
+            <a:r>
+              <a:rPr lang="en-US" sz="2400" dirty="0">
+                <a:solidFill>
+                  <a:srgbClr val="C4E3B0"/>
+                </a:solidFill>
+              </a:rPr>
+              <a:t>It is called before component is mounted. Typically, in React constructors are only used for two purposes:</a:t>
+            </a:r>
+          </a:p>
+          <a:p>
+            <a:endParaRPr lang="en-US" sz="2400" dirty="0">
+              <a:solidFill>
+                <a:srgbClr val="C4E3B0"/>
+              </a:solidFill>
+            </a:endParaRPr>
+          </a:p>
+          <a:p>
+            <a:pPr marL="990575" lvl="1" indent="-380990">
+              <a:buFont typeface="Arial" panose="020B0604020202020204" pitchFamily="34" charset="0"/>
+              <a:buChar char="•"/>
+            </a:pPr>
+            <a:r>
+              <a:rPr lang="en-US" sz="2400" dirty="0">
+                <a:solidFill>
+                  <a:srgbClr val="C4E3B0"/>
+                </a:solidFill>
+              </a:rPr>
+              <a:t>Binding event handler methods to an instance</a:t>
+            </a:r>
+          </a:p>
+          <a:p>
+            <a:pPr marL="990575" lvl="1" indent="-380990">
+              <a:buFont typeface="Arial" panose="020B0604020202020204" pitchFamily="34" charset="0"/>
+              <a:buChar char="•"/>
+            </a:pPr>
+            <a:r>
+              <a:rPr lang="en-US" sz="2400" dirty="0">
+                <a:solidFill>
+                  <a:srgbClr val="C4E3B0"/>
+                </a:solidFill>
+              </a:rPr>
+              <a:t>Initializing local state by assigning an object to this.state.</a:t>
+            </a:r>
+          </a:p>
+          <a:p>
+            <a:endParaRPr lang="en-US" sz="2400" dirty="0">
+              <a:solidFill>
+                <a:schemeClr val="bg1"/>
+              </a:solidFill>
+            </a:endParaRPr>
+          </a:p>
+        </p:txBody>
+      </p:sp>
+      <p:sp>
+        <p:nvSpPr>
+          <p:cNvPr id="23" name="Title 1"/>
+          <p:cNvSpPr txBox="1">
+            <a:spLocks/>
+          </p:cNvSpPr>
+          <p:nvPr/>
+        </p:nvSpPr>
+        <p:spPr>
+          <a:xfrm>
+            <a:off x="982133" y="2819400"/>
+            <a:ext cx="11514667" cy="812800"/>
+          </a:xfrm>
+          <a:prstGeom prst="rect">
+            <a:avLst/>
+          </a:prstGeom>
+        </p:spPr>
+        <p:txBody>
+          <a:bodyPr/>
+          <a:lstStyle>
+            <a:lvl1pPr algn="l" defTabSz="457200" rtl="0" eaLnBrk="1" latinLnBrk="0" hangingPunct="1">
+              <a:spcBef>
+                <a:spcPct val="0"/>
+              </a:spcBef>
+              <a:buNone/>
+              <a:defRPr sz="2000" b="1" kern="1200" baseline="0">
+                <a:solidFill>
+                  <a:schemeClr val="bg1"/>
+                </a:solidFill>
+                <a:latin typeface="+mj-lt"/>
+                <a:ea typeface="+mj-ea"/>
+                <a:cs typeface="+mj-cs"/>
+              </a:defRPr>
+            </a:lvl1pPr>
+          </a:lstStyle>
+          <a:p>
+            <a:pPr marL="380990" indent="-380990">
+              <a:buFont typeface="Arial" panose="020B0604020202020204" pitchFamily="34" charset="0"/>
+              <a:buChar char="•"/>
+            </a:pPr>
+            <a:endParaRPr lang="en-US" sz="2400" dirty="0">
+              <a:solidFill>
+                <a:srgbClr val="C4E3B0"/>
+              </a:solidFill>
+              <a:latin typeface="+mn-lt"/>
+              <a:ea typeface="+mn-ea"/>
+              <a:cs typeface="+mn-cs"/>
+            </a:endParaRPr>
+          </a:p>
+        </p:txBody>
+      </p:sp>
+      <p:sp>
+        <p:nvSpPr>
+          <p:cNvPr id="24" name="Title 1"/>
+          <p:cNvSpPr txBox="1">
+            <a:spLocks/>
+          </p:cNvSpPr>
+          <p:nvPr/>
+        </p:nvSpPr>
+        <p:spPr>
+          <a:xfrm>
+            <a:off x="474134" y="374875"/>
+            <a:ext cx="11186220" cy="607259"/>
+          </a:xfrm>
+          <a:prstGeom prst="rect">
+            <a:avLst/>
+          </a:prstGeom>
+        </p:spPr>
+        <p:txBody>
+          <a:bodyPr/>
+          <a:lstStyle>
+            <a:lvl1pPr algn="l" defTabSz="457200" rtl="0" eaLnBrk="1" latinLnBrk="0" hangingPunct="1">
+              <a:spcBef>
+                <a:spcPct val="0"/>
+              </a:spcBef>
+              <a:buNone/>
+              <a:defRPr sz="2000" b="1" kern="1200" baseline="0">
+                <a:solidFill>
+                  <a:schemeClr val="bg1"/>
+                </a:solidFill>
+                <a:latin typeface="+mj-lt"/>
+                <a:ea typeface="+mj-ea"/>
+                <a:cs typeface="+mj-cs"/>
+              </a:defRPr>
+            </a:lvl1pPr>
+          </a:lstStyle>
+          <a:p>
+            <a:r>
+              <a:rPr lang="en-US" sz="3200" dirty="0">
+                <a:solidFill>
+                  <a:schemeClr val="bg1">
+                    <a:lumMod val="85000"/>
+                  </a:schemeClr>
+                </a:solidFill>
+              </a:rPr>
+              <a:t>Commonly Used Lifecycle Methods</a:t>
+            </a:r>
+          </a:p>
+        </p:txBody>
+      </p:sp>
+    </p:spTree>
+    <p:extLst>
+      <p:ext uri="{BB962C8B-B14F-4D97-AF65-F5344CB8AC3E}">
+        <p14:creationId xmlns:p14="http://schemas.microsoft.com/office/powerpoint/2010/main" val="61651120"/>
+      </p:ext>
+    </p:extLst>
+  </p:cSld>
+  <p:clrMapOvr>
+    <a:masterClrMapping/>
+  </p:clrMapOvr>
+</p:sld>
+</file>
+
 <file path=ppt/slides/slide29.xml><?xml version="1.0" encoding="utf-8"?>
 <p:sld xmlns:a="http://schemas.openxmlformats.org/drawingml/2006/main" xmlns:r="http://schemas.openxmlformats.org/officeDocument/2006/relationships" xmlns:p="http://schemas.openxmlformats.org/presentationml/2006/main">
   <p:cSld>
@@ -14991,220 +15144,95 @@
       </p:grpSpPr>
       <p:sp>
         <p:nvSpPr>
-          <p:cNvPr id="21" name="Title 1"/>
-          <p:cNvSpPr txBox="1">
-            <a:spLocks/>
+          <p:cNvPr id="7" name="Rectangle 11"/>
+          <p:cNvSpPr>
+            <a:spLocks noChangeArrowheads="1"/>
           </p:cNvSpPr>
           <p:nvPr/>
         </p:nvSpPr>
-        <p:spPr>
+        <p:spPr bwMode="auto">
           <a:xfrm>
-            <a:off x="474133" y="3835400"/>
-            <a:ext cx="11379200" cy="2336800"/>
-          </a:xfrm>
-          <a:prstGeom prst="rect">
-            <a:avLst/>
-          </a:prstGeom>
-        </p:spPr>
-        <p:txBody>
-          <a:bodyPr/>
-          <a:lstStyle>
-            <a:lvl1pPr algn="l" defTabSz="457200" rtl="0" eaLnBrk="1" latinLnBrk="0" hangingPunct="1">
-              <a:spcBef>
-                <a:spcPct val="0"/>
-              </a:spcBef>
-              <a:buNone/>
-              <a:defRPr sz="2000" b="1" kern="1200" baseline="0">
-                <a:solidFill>
-                  <a:schemeClr val="bg1"/>
-                </a:solidFill>
-                <a:latin typeface="+mj-lt"/>
-                <a:ea typeface="+mj-ea"/>
-                <a:cs typeface="+mj-cs"/>
-              </a:defRPr>
-            </a:lvl1pPr>
-          </a:lstStyle>
-          <a:p>
-            <a:r>
-              <a:rPr lang="en-US" sz="2400" dirty="0">
-                <a:solidFill>
-                  <a:schemeClr val="bg1">
-                    <a:lumMod val="85000"/>
-                  </a:schemeClr>
-                </a:solidFill>
-              </a:rPr>
-              <a:t>ComponentDidMount() </a:t>
-            </a:r>
-            <a:r>
-              <a:rPr lang="en-US" sz="2400" b="0" dirty="0">
-                <a:solidFill>
-                  <a:srgbClr val="C4E3B0"/>
-                </a:solidFill>
-              </a:rPr>
-              <a:t>- Invoked immediately after a component is mounted.</a:t>
-            </a:r>
-          </a:p>
-          <a:p>
-            <a:endParaRPr lang="en-US" sz="2400" b="0" dirty="0">
-              <a:solidFill>
-                <a:srgbClr val="C4E3B0"/>
-              </a:solidFill>
-            </a:endParaRPr>
-          </a:p>
-          <a:p>
-            <a:pPr marL="1066773" lvl="1" indent="-457189">
-              <a:buFont typeface="Arial" panose="020B0604020202020204" pitchFamily="34" charset="0"/>
-              <a:buChar char="•"/>
-            </a:pPr>
-            <a:r>
-              <a:rPr lang="en-US" sz="2400" dirty="0">
-                <a:solidFill>
-                  <a:srgbClr val="C4E3B0"/>
-                </a:solidFill>
-              </a:rPr>
-              <a:t>Initialization that requires DOM nodes should go here.</a:t>
-            </a:r>
-          </a:p>
-          <a:p>
-            <a:pPr marL="1066773" lvl="1" indent="-457189">
-              <a:buFont typeface="Arial" panose="020B0604020202020204" pitchFamily="34" charset="0"/>
-              <a:buChar char="•"/>
-            </a:pPr>
-            <a:r>
-              <a:rPr lang="en-US" sz="2400" dirty="0">
-                <a:solidFill>
-                  <a:srgbClr val="C4E3B0"/>
-                </a:solidFill>
-              </a:rPr>
-              <a:t>Its a good place to set up any subscriptions. If you do that, don’t forget to unsubscribe in </a:t>
-            </a:r>
-            <a:r>
-              <a:rPr lang="en-US" sz="2400" dirty="0" err="1">
-                <a:solidFill>
-                  <a:srgbClr val="C4E3B0"/>
-                </a:solidFill>
-              </a:rPr>
-              <a:t>componentWillUnmount</a:t>
-            </a:r>
-            <a:r>
-              <a:rPr lang="en-US" sz="2400" dirty="0">
-                <a:solidFill>
-                  <a:srgbClr val="C4E3B0"/>
-                </a:solidFill>
-              </a:rPr>
-              <a:t>(). </a:t>
-            </a:r>
-          </a:p>
-          <a:p>
-            <a:endParaRPr lang="en-US" sz="2400" b="0" dirty="0">
-              <a:solidFill>
-                <a:srgbClr val="C4E3B0"/>
-              </a:solidFill>
-            </a:endParaRPr>
-          </a:p>
-          <a:p>
-            <a:br>
-              <a:rPr lang="en-US" sz="2400" dirty="0">
-                <a:solidFill>
-                  <a:srgbClr val="C4E3B0"/>
-                </a:solidFill>
-                <a:latin typeface="+mn-lt"/>
-              </a:rPr>
-            </a:br>
-            <a:endParaRPr lang="en-US" sz="2400" dirty="0">
-              <a:solidFill>
-                <a:srgbClr val="C4E3B0"/>
-              </a:solidFill>
-              <a:latin typeface="+mn-lt"/>
-            </a:endParaRPr>
-          </a:p>
-        </p:txBody>
-      </p:sp>
-      <p:sp>
-        <p:nvSpPr>
-          <p:cNvPr id="22" name="TextBox 21"/>
-          <p:cNvSpPr txBox="1"/>
-          <p:nvPr/>
-        </p:nvSpPr>
-        <p:spPr>
-          <a:xfrm>
-            <a:off x="474133" y="1394699"/>
-            <a:ext cx="10566400" cy="2308324"/>
+            <a:off x="648574" y="3022632"/>
+            <a:ext cx="10847548" cy="2322624"/>
           </a:xfrm>
           <a:prstGeom prst="rect">
             <a:avLst/>
           </a:prstGeom>
           <a:noFill/>
+          <a:ln>
+            <a:noFill/>
+          </a:ln>
+          <a:effectLst/>
+          <a:extLst>
+            <a:ext uri="{909E8E84-426E-40DD-AFC4-6F175D3DCCD1}">
+              <a14:hiddenFill xmlns:a14="http://schemas.microsoft.com/office/drawing/2010/main">
+                <a:solidFill>
+                  <a:schemeClr val="accent1"/>
+                </a:solidFill>
+              </a14:hiddenFill>
+            </a:ext>
+            <a:ext uri="{91240B29-F687-4F45-9708-019B960494DF}">
+              <a14:hiddenLine xmlns:a14="http://schemas.microsoft.com/office/drawing/2010/main" w="9525">
+                <a:solidFill>
+                  <a:schemeClr val="tx1"/>
+                </a:solidFill>
+                <a:miter lim="800000"/>
+                <a:headEnd/>
+                <a:tailEnd/>
+              </a14:hiddenLine>
+            </a:ext>
+            <a:ext uri="{AF507438-7753-43E0-B8FC-AC1667EBCBE1}">
+              <a14:hiddenEffects xmlns:a14="http://schemas.microsoft.com/office/drawing/2010/main">
+                <a:effectLst>
+                  <a:outerShdw dist="35921" dir="2700000" algn="ctr" rotWithShape="0">
+                    <a:schemeClr val="bg2"/>
+                  </a:outerShdw>
+                </a:effectLst>
+              </a14:hiddenEffects>
+            </a:ext>
+          </a:extLst>
         </p:spPr>
         <p:txBody>
-          <a:bodyPr wrap="square" rtlCol="0">
+          <a:bodyPr vert="horz" wrap="square" lIns="0" tIns="0" rIns="0" bIns="0" numCol="1" anchor="ctr" anchorCtr="0" compatLnSpc="1">
+            <a:prstTxWarp prst="textNoShape">
+              <a:avLst/>
+            </a:prstTxWarp>
             <a:spAutoFit/>
           </a:bodyPr>
           <a:lstStyle/>
           <a:p>
             <a:r>
-              <a:rPr lang="en-US" sz="2400" dirty="0">
+              <a:rPr lang="en-US" sz="2400" b="1" dirty="0" err="1">
                 <a:solidFill>
                   <a:schemeClr val="bg1">
                     <a:lumMod val="85000"/>
                   </a:schemeClr>
                 </a:solidFill>
               </a:rPr>
-              <a:t> </a:t>
-            </a:r>
-            <a:r>
-              <a:rPr lang="en-US" sz="2400" b="1" dirty="0">
-                <a:solidFill>
-                  <a:schemeClr val="bg1">
-                    <a:lumMod val="85000"/>
-                  </a:schemeClr>
-                </a:solidFill>
-              </a:rPr>
-              <a:t>Constructor</a:t>
-            </a:r>
-            <a:r>
-              <a:rPr lang="en-US" sz="2400" dirty="0">
-                <a:solidFill>
-                  <a:schemeClr val="bg1"/>
-                </a:solidFill>
-              </a:rPr>
-              <a:t> </a:t>
-            </a:r>
-            <a:r>
-              <a:rPr lang="en-US" sz="2400" b="1" dirty="0">
-                <a:solidFill>
-                  <a:schemeClr val="bg1"/>
-                </a:solidFill>
-              </a:rPr>
-              <a:t>-</a:t>
-            </a:r>
-            <a:r>
-              <a:rPr lang="en-US" sz="2400" dirty="0">
-                <a:solidFill>
-                  <a:schemeClr val="bg1"/>
-                </a:solidFill>
-              </a:rPr>
-              <a:t> </a:t>
-            </a:r>
-            <a:r>
-              <a:rPr lang="en-US" sz="2400" dirty="0">
+              <a:t>ComponentWillUnmount</a:t>
+            </a:r>
+            <a:r>
+              <a:rPr lang="en-US" sz="2133" dirty="0">
                 <a:solidFill>
                   <a:srgbClr val="C4E3B0"/>
                 </a:solidFill>
               </a:rPr>
-              <a:t>It is called before component is mounted. Typically, in React constructors are only used for two purposes:</a:t>
-            </a:r>
-          </a:p>
-          <a:p>
-            <a:endParaRPr lang="en-US" sz="2400" dirty="0">
+              <a:t>() </a:t>
+            </a:r>
+          </a:p>
+          <a:p>
+            <a:endParaRPr lang="en-US" sz="2133" dirty="0">
               <a:solidFill>
                 <a:srgbClr val="C4E3B0"/>
               </a:solidFill>
             </a:endParaRPr>
           </a:p>
           <a:p>
-            <a:pPr marL="990575" lvl="1" indent="-380990">
-              <a:buFont typeface="Arial" panose="020B0604020202020204" pitchFamily="34" charset="0"/>
+            <a:pPr marL="1066773" lvl="1" indent="-457189" defTabSz="609585">
+              <a:spcBef>
+                <a:spcPct val="20000"/>
+              </a:spcBef>
+              <a:buFont typeface="Arial"/>
               <a:buChar char="•"/>
             </a:pPr>
             <a:r>
@@ -15213,12 +15241,15 @@
                   <a:srgbClr val="C4E3B0"/>
                 </a:solidFill>
               </a:rPr>
-              <a:t>Binding event handler methods to an instance</a:t>
-            </a:r>
-          </a:p>
-          <a:p>
-            <a:pPr marL="990575" lvl="1" indent="-380990">
-              <a:buFont typeface="Arial" panose="020B0604020202020204" pitchFamily="34" charset="0"/>
+              <a:t>Invoked immediately before a component is unmounted and destroyed. .</a:t>
+            </a:r>
+          </a:p>
+          <a:p>
+            <a:pPr marL="1066773" lvl="1" indent="-457189" defTabSz="609585">
+              <a:spcBef>
+                <a:spcPct val="20000"/>
+              </a:spcBef>
+              <a:buFont typeface="Arial"/>
               <a:buChar char="•"/>
             </a:pPr>
             <a:r>
@@ -15227,122 +15258,172 @@
                   <a:srgbClr val="C4E3B0"/>
                 </a:solidFill>
               </a:rPr>
-              <a:t>Initializing local state by assigning an object to this.state.</a:t>
-            </a:r>
-          </a:p>
-          <a:p>
-            <a:endParaRPr lang="en-US" sz="2400" dirty="0">
+              <a:t>Perform any necessary cleanup in this method, such as invalidating timers, canceling network requests, or cleaning up any subscriptions that were created in componentDidMount().</a:t>
+            </a:r>
+            <a:endParaRPr lang="en-US" altLang="en-US" sz="2400" dirty="0">
               <a:solidFill>
-                <a:schemeClr val="bg1"/>
+                <a:srgbClr val="C4E3B0"/>
               </a:solidFill>
+              <a:latin typeface="Arial" panose="020B0604020202020204" pitchFamily="34" charset="0"/>
             </a:endParaRPr>
           </a:p>
         </p:txBody>
       </p:sp>
       <p:sp>
         <p:nvSpPr>
-          <p:cNvPr id="23" name="Title 1"/>
-          <p:cNvSpPr txBox="1">
-            <a:spLocks/>
+          <p:cNvPr id="8" name="Rectangle 11"/>
+          <p:cNvSpPr>
+            <a:spLocks noChangeArrowheads="1"/>
           </p:cNvSpPr>
           <p:nvPr/>
         </p:nvSpPr>
-        <p:spPr>
+        <p:spPr bwMode="auto">
           <a:xfrm>
-            <a:off x="982133" y="2819400"/>
-            <a:ext cx="11514667" cy="812800"/>
+            <a:off x="648573" y="787431"/>
+            <a:ext cx="10972800" cy="1953292"/>
           </a:xfrm>
           <a:prstGeom prst="rect">
             <a:avLst/>
           </a:prstGeom>
+          <a:noFill/>
+          <a:ln>
+            <a:noFill/>
+          </a:ln>
+          <a:effectLst/>
+          <a:extLst>
+            <a:ext uri="{909E8E84-426E-40DD-AFC4-6F175D3DCCD1}">
+              <a14:hiddenFill xmlns:a14="http://schemas.microsoft.com/office/drawing/2010/main">
+                <a:solidFill>
+                  <a:schemeClr val="accent1"/>
+                </a:solidFill>
+              </a14:hiddenFill>
+            </a:ext>
+            <a:ext uri="{91240B29-F687-4F45-9708-019B960494DF}">
+              <a14:hiddenLine xmlns:a14="http://schemas.microsoft.com/office/drawing/2010/main" w="9525">
+                <a:solidFill>
+                  <a:schemeClr val="tx1"/>
+                </a:solidFill>
+                <a:miter lim="800000"/>
+                <a:headEnd/>
+                <a:tailEnd/>
+              </a14:hiddenLine>
+            </a:ext>
+            <a:ext uri="{AF507438-7753-43E0-B8FC-AC1667EBCBE1}">
+              <a14:hiddenEffects xmlns:a14="http://schemas.microsoft.com/office/drawing/2010/main">
+                <a:effectLst>
+                  <a:outerShdw dist="35921" dir="2700000" algn="ctr" rotWithShape="0">
+                    <a:schemeClr val="bg2"/>
+                  </a:outerShdw>
+                </a:effectLst>
+              </a14:hiddenEffects>
+            </a:ext>
+          </a:extLst>
         </p:spPr>
         <p:txBody>
-          <a:bodyPr/>
-          <a:lstStyle>
-            <a:lvl1pPr algn="l" defTabSz="457200" rtl="0" eaLnBrk="1" latinLnBrk="0" hangingPunct="1">
+          <a:bodyPr vert="horz" wrap="square" lIns="0" tIns="0" rIns="0" bIns="0" numCol="1" anchor="ctr" anchorCtr="0" compatLnSpc="1">
+            <a:prstTxWarp prst="textNoShape">
+              <a:avLst/>
+            </a:prstTxWarp>
+            <a:spAutoFit/>
+          </a:bodyPr>
+          <a:lstStyle/>
+          <a:p>
+            <a:r>
+              <a:rPr lang="en-US" sz="2400" b="1" dirty="0">
+                <a:solidFill>
+                  <a:schemeClr val="bg1">
+                    <a:lumMod val="85000"/>
+                  </a:schemeClr>
+                </a:solidFill>
+              </a:rPr>
+              <a:t>ComponentDidUpdate</a:t>
+            </a:r>
+            <a:r>
+              <a:rPr lang="en-US" sz="2400" b="1" dirty="0">
+                <a:solidFill>
+                  <a:srgbClr val="C4E3B0"/>
+                </a:solidFill>
+              </a:rPr>
+              <a:t>() </a:t>
+            </a:r>
+          </a:p>
+          <a:p>
+            <a:endParaRPr lang="en-US" sz="2400" b="1" dirty="0">
+              <a:solidFill>
+                <a:srgbClr val="C4E3B0"/>
+              </a:solidFill>
+            </a:endParaRPr>
+          </a:p>
+          <a:p>
+            <a:pPr marL="1066773" lvl="1" indent="-457189" defTabSz="609585">
+              <a:spcBef>
+                <a:spcPct val="20000"/>
+              </a:spcBef>
+              <a:buFont typeface="Arial"/>
+              <a:buChar char="•"/>
+            </a:pPr>
+            <a:r>
+              <a:rPr lang="en-US" sz="2400" dirty="0">
+                <a:solidFill>
+                  <a:srgbClr val="C4E3B0"/>
+                </a:solidFill>
+              </a:rPr>
+              <a:t>Invoked immediately after updating occurs.</a:t>
+            </a:r>
+          </a:p>
+          <a:p>
+            <a:pPr marL="1066773" lvl="1" indent="-457189" defTabSz="609585">
+              <a:spcBef>
+                <a:spcPct val="20000"/>
+              </a:spcBef>
+              <a:buFont typeface="Arial"/>
+              <a:buChar char="•"/>
+            </a:pPr>
+            <a:r>
+              <a:rPr lang="en-US" sz="2400" dirty="0">
+                <a:solidFill>
+                  <a:srgbClr val="C4E3B0"/>
+                </a:solidFill>
+              </a:rPr>
+              <a:t>This is also a good place to do network requests</a:t>
+            </a:r>
+            <a:r>
+              <a:rPr lang="en-US" sz="2133" dirty="0">
+                <a:solidFill>
+                  <a:srgbClr val="C4E3B0"/>
+                </a:solidFill>
+              </a:rPr>
+              <a:t>.</a:t>
+            </a:r>
+            <a:endParaRPr lang="en-US" altLang="en-US" sz="2133" dirty="0">
+              <a:solidFill>
+                <a:srgbClr val="C4E3B0"/>
+              </a:solidFill>
+              <a:ea typeface="Times New Roman" panose="02020603050405020304" pitchFamily="18" charset="0"/>
+            </a:endParaRPr>
+          </a:p>
+          <a:p>
+            <a:pPr lvl="1" eaLnBrk="0" fontAlgn="base" hangingPunct="0">
               <a:spcBef>
                 <a:spcPct val="0"/>
               </a:spcBef>
-              <a:buNone/>
-              <a:defRPr sz="2000" b="1" kern="1200" baseline="0">
-                <a:solidFill>
-                  <a:schemeClr val="bg1"/>
-                </a:solidFill>
-                <a:latin typeface="+mj-lt"/>
-                <a:ea typeface="+mj-ea"/>
-                <a:cs typeface="+mj-cs"/>
-              </a:defRPr>
-            </a:lvl1pPr>
-          </a:lstStyle>
-          <a:p>
-            <a:pPr marL="380990" indent="-380990">
-              <a:buFont typeface="Arial" panose="020B0604020202020204" pitchFamily="34" charset="0"/>
-              <a:buChar char="•"/>
+              <a:spcAft>
+                <a:spcPct val="0"/>
+              </a:spcAft>
             </a:pPr>
-            <a:endParaRPr lang="en-US" sz="2400" dirty="0">
+            <a:endParaRPr lang="en-US" altLang="en-US" sz="2133" dirty="0">
               <a:solidFill>
                 <a:srgbClr val="C4E3B0"/>
               </a:solidFill>
-              <a:latin typeface="+mn-lt"/>
-              <a:ea typeface="+mn-ea"/>
-              <a:cs typeface="+mn-cs"/>
+              <a:latin typeface="Arial" panose="020B0604020202020204" pitchFamily="34" charset="0"/>
             </a:endParaRPr>
-          </a:p>
-        </p:txBody>
-      </p:sp>
-      <p:sp>
-        <p:nvSpPr>
-          <p:cNvPr id="24" name="Title 1"/>
-          <p:cNvSpPr txBox="1">
-            <a:spLocks/>
-          </p:cNvSpPr>
-          <p:nvPr/>
-        </p:nvSpPr>
-        <p:spPr>
-          <a:xfrm>
-            <a:off x="474134" y="374875"/>
-            <a:ext cx="11186220" cy="607259"/>
-          </a:xfrm>
-          <a:prstGeom prst="rect">
-            <a:avLst/>
-          </a:prstGeom>
-        </p:spPr>
-        <p:txBody>
-          <a:bodyPr/>
-          <a:lstStyle>
-            <a:lvl1pPr algn="l" defTabSz="457200" rtl="0" eaLnBrk="1" latinLnBrk="0" hangingPunct="1">
-              <a:spcBef>
-                <a:spcPct val="0"/>
-              </a:spcBef>
-              <a:buNone/>
-              <a:defRPr sz="2000" b="1" kern="1200" baseline="0">
-                <a:solidFill>
-                  <a:schemeClr val="bg1"/>
-                </a:solidFill>
-                <a:latin typeface="+mj-lt"/>
-                <a:ea typeface="+mj-ea"/>
-                <a:cs typeface="+mj-cs"/>
-              </a:defRPr>
-            </a:lvl1pPr>
-          </a:lstStyle>
-          <a:p>
-            <a:r>
-              <a:rPr lang="en-US" sz="3200" dirty="0">
-                <a:solidFill>
-                  <a:schemeClr val="bg1">
-                    <a:lumMod val="85000"/>
-                  </a:schemeClr>
-                </a:solidFill>
-              </a:rPr>
-              <a:t>Commonly Used Lifecycle Methods</a:t>
-            </a:r>
           </a:p>
         </p:txBody>
       </p:sp>
     </p:spTree>
     <p:extLst>
       <p:ext uri="{BB962C8B-B14F-4D97-AF65-F5344CB8AC3E}">
-        <p14:creationId xmlns:p14="http://schemas.microsoft.com/office/powerpoint/2010/main" val="61651120"/>
+        <p14:creationId xmlns:p14="http://schemas.microsoft.com/office/powerpoint/2010/main" val="2675055008"/>
       </p:ext>
     </p:extLst>
   </p:cSld>
@@ -15488,314 +15569,6 @@
       </p:grpSpPr>
       <p:sp>
         <p:nvSpPr>
-          <p:cNvPr id="7" name="Rectangle 11"/>
-          <p:cNvSpPr>
-            <a:spLocks noChangeArrowheads="1"/>
-          </p:cNvSpPr>
-          <p:nvPr/>
-        </p:nvSpPr>
-        <p:spPr bwMode="auto">
-          <a:xfrm>
-            <a:off x="648574" y="3022632"/>
-            <a:ext cx="10847548" cy="2322624"/>
-          </a:xfrm>
-          <a:prstGeom prst="rect">
-            <a:avLst/>
-          </a:prstGeom>
-          <a:noFill/>
-          <a:ln>
-            <a:noFill/>
-          </a:ln>
-          <a:effectLst/>
-          <a:extLst>
-            <a:ext uri="{909E8E84-426E-40DD-AFC4-6F175D3DCCD1}">
-              <a14:hiddenFill xmlns:a14="http://schemas.microsoft.com/office/drawing/2010/main">
-                <a:solidFill>
-                  <a:schemeClr val="accent1"/>
-                </a:solidFill>
-              </a14:hiddenFill>
-            </a:ext>
-            <a:ext uri="{91240B29-F687-4F45-9708-019B960494DF}">
-              <a14:hiddenLine xmlns:a14="http://schemas.microsoft.com/office/drawing/2010/main" w="9525">
-                <a:solidFill>
-                  <a:schemeClr val="tx1"/>
-                </a:solidFill>
-                <a:miter lim="800000"/>
-                <a:headEnd/>
-                <a:tailEnd/>
-              </a14:hiddenLine>
-            </a:ext>
-            <a:ext uri="{AF507438-7753-43E0-B8FC-AC1667EBCBE1}">
-              <a14:hiddenEffects xmlns:a14="http://schemas.microsoft.com/office/drawing/2010/main">
-                <a:effectLst>
-                  <a:outerShdw dist="35921" dir="2700000" algn="ctr" rotWithShape="0">
-                    <a:schemeClr val="bg2"/>
-                  </a:outerShdw>
-                </a:effectLst>
-              </a14:hiddenEffects>
-            </a:ext>
-          </a:extLst>
-        </p:spPr>
-        <p:txBody>
-          <a:bodyPr vert="horz" wrap="square" lIns="0" tIns="0" rIns="0" bIns="0" numCol="1" anchor="ctr" anchorCtr="0" compatLnSpc="1">
-            <a:prstTxWarp prst="textNoShape">
-              <a:avLst/>
-            </a:prstTxWarp>
-            <a:spAutoFit/>
-          </a:bodyPr>
-          <a:lstStyle/>
-          <a:p>
-            <a:r>
-              <a:rPr lang="en-US" sz="2400" b="1" dirty="0" err="1">
-                <a:solidFill>
-                  <a:schemeClr val="bg1">
-                    <a:lumMod val="85000"/>
-                  </a:schemeClr>
-                </a:solidFill>
-              </a:rPr>
-              <a:t>ComponentWillUnmount</a:t>
-            </a:r>
-            <a:r>
-              <a:rPr lang="en-US" sz="2133" dirty="0">
-                <a:solidFill>
-                  <a:srgbClr val="C4E3B0"/>
-                </a:solidFill>
-              </a:rPr>
-              <a:t>() </a:t>
-            </a:r>
-          </a:p>
-          <a:p>
-            <a:endParaRPr lang="en-US" sz="2133" dirty="0">
-              <a:solidFill>
-                <a:srgbClr val="C4E3B0"/>
-              </a:solidFill>
-            </a:endParaRPr>
-          </a:p>
-          <a:p>
-            <a:pPr marL="1066773" lvl="1" indent="-457189" defTabSz="609585">
-              <a:spcBef>
-                <a:spcPct val="20000"/>
-              </a:spcBef>
-              <a:buFont typeface="Arial"/>
-              <a:buChar char="•"/>
-            </a:pPr>
-            <a:r>
-              <a:rPr lang="en-US" sz="2400" dirty="0">
-                <a:solidFill>
-                  <a:srgbClr val="C4E3B0"/>
-                </a:solidFill>
-              </a:rPr>
-              <a:t>Invoked immediately before a component is unmounted and destroyed. .</a:t>
-            </a:r>
-          </a:p>
-          <a:p>
-            <a:pPr marL="1066773" lvl="1" indent="-457189" defTabSz="609585">
-              <a:spcBef>
-                <a:spcPct val="20000"/>
-              </a:spcBef>
-              <a:buFont typeface="Arial"/>
-              <a:buChar char="•"/>
-            </a:pPr>
-            <a:r>
-              <a:rPr lang="en-US" sz="2400" dirty="0">
-                <a:solidFill>
-                  <a:srgbClr val="C4E3B0"/>
-                </a:solidFill>
-              </a:rPr>
-              <a:t>Perform any necessary cleanup in this method, such as invalidating timers, canceling network requests, or cleaning up any subscriptions that were created in componentDidMount().</a:t>
-            </a:r>
-            <a:endParaRPr lang="en-US" altLang="en-US" sz="2400" dirty="0">
-              <a:solidFill>
-                <a:srgbClr val="C4E3B0"/>
-              </a:solidFill>
-              <a:latin typeface="Arial" panose="020B0604020202020204" pitchFamily="34" charset="0"/>
-            </a:endParaRPr>
-          </a:p>
-        </p:txBody>
-      </p:sp>
-      <p:sp>
-        <p:nvSpPr>
-          <p:cNvPr id="8" name="Rectangle 11"/>
-          <p:cNvSpPr>
-            <a:spLocks noChangeArrowheads="1"/>
-          </p:cNvSpPr>
-          <p:nvPr/>
-        </p:nvSpPr>
-        <p:spPr bwMode="auto">
-          <a:xfrm>
-            <a:off x="648573" y="787431"/>
-            <a:ext cx="10972800" cy="1953292"/>
-          </a:xfrm>
-          <a:prstGeom prst="rect">
-            <a:avLst/>
-          </a:prstGeom>
-          <a:noFill/>
-          <a:ln>
-            <a:noFill/>
-          </a:ln>
-          <a:effectLst/>
-          <a:extLst>
-            <a:ext uri="{909E8E84-426E-40DD-AFC4-6F175D3DCCD1}">
-              <a14:hiddenFill xmlns:a14="http://schemas.microsoft.com/office/drawing/2010/main">
-                <a:solidFill>
-                  <a:schemeClr val="accent1"/>
-                </a:solidFill>
-              </a14:hiddenFill>
-            </a:ext>
-            <a:ext uri="{91240B29-F687-4F45-9708-019B960494DF}">
-              <a14:hiddenLine xmlns:a14="http://schemas.microsoft.com/office/drawing/2010/main" w="9525">
-                <a:solidFill>
-                  <a:schemeClr val="tx1"/>
-                </a:solidFill>
-                <a:miter lim="800000"/>
-                <a:headEnd/>
-                <a:tailEnd/>
-              </a14:hiddenLine>
-            </a:ext>
-            <a:ext uri="{AF507438-7753-43E0-B8FC-AC1667EBCBE1}">
-              <a14:hiddenEffects xmlns:a14="http://schemas.microsoft.com/office/drawing/2010/main">
-                <a:effectLst>
-                  <a:outerShdw dist="35921" dir="2700000" algn="ctr" rotWithShape="0">
-                    <a:schemeClr val="bg2"/>
-                  </a:outerShdw>
-                </a:effectLst>
-              </a14:hiddenEffects>
-            </a:ext>
-          </a:extLst>
-        </p:spPr>
-        <p:txBody>
-          <a:bodyPr vert="horz" wrap="square" lIns="0" tIns="0" rIns="0" bIns="0" numCol="1" anchor="ctr" anchorCtr="0" compatLnSpc="1">
-            <a:prstTxWarp prst="textNoShape">
-              <a:avLst/>
-            </a:prstTxWarp>
-            <a:spAutoFit/>
-          </a:bodyPr>
-          <a:lstStyle/>
-          <a:p>
-            <a:r>
-              <a:rPr lang="en-US" sz="2400" b="1" dirty="0">
-                <a:solidFill>
-                  <a:schemeClr val="bg1">
-                    <a:lumMod val="85000"/>
-                  </a:schemeClr>
-                </a:solidFill>
-              </a:rPr>
-              <a:t>ComponentDidUpdate</a:t>
-            </a:r>
-            <a:r>
-              <a:rPr lang="en-US" sz="2400" b="1" dirty="0">
-                <a:solidFill>
-                  <a:srgbClr val="C4E3B0"/>
-                </a:solidFill>
-              </a:rPr>
-              <a:t>() </a:t>
-            </a:r>
-          </a:p>
-          <a:p>
-            <a:endParaRPr lang="en-US" sz="2400" b="1" dirty="0">
-              <a:solidFill>
-                <a:srgbClr val="C4E3B0"/>
-              </a:solidFill>
-            </a:endParaRPr>
-          </a:p>
-          <a:p>
-            <a:pPr marL="1066773" lvl="1" indent="-457189" defTabSz="609585">
-              <a:spcBef>
-                <a:spcPct val="20000"/>
-              </a:spcBef>
-              <a:buFont typeface="Arial"/>
-              <a:buChar char="•"/>
-            </a:pPr>
-            <a:r>
-              <a:rPr lang="en-US" sz="2400" dirty="0">
-                <a:solidFill>
-                  <a:srgbClr val="C4E3B0"/>
-                </a:solidFill>
-              </a:rPr>
-              <a:t>Invoked immediately after updating occurs.</a:t>
-            </a:r>
-          </a:p>
-          <a:p>
-            <a:pPr marL="1066773" lvl="1" indent="-457189" defTabSz="609585">
-              <a:spcBef>
-                <a:spcPct val="20000"/>
-              </a:spcBef>
-              <a:buFont typeface="Arial"/>
-              <a:buChar char="•"/>
-            </a:pPr>
-            <a:r>
-              <a:rPr lang="en-US" sz="2400" dirty="0">
-                <a:solidFill>
-                  <a:srgbClr val="C4E3B0"/>
-                </a:solidFill>
-              </a:rPr>
-              <a:t>This is also a good place to do network requests</a:t>
-            </a:r>
-            <a:r>
-              <a:rPr lang="en-US" sz="2133" dirty="0">
-                <a:solidFill>
-                  <a:srgbClr val="C4E3B0"/>
-                </a:solidFill>
-              </a:rPr>
-              <a:t>.</a:t>
-            </a:r>
-            <a:endParaRPr lang="en-US" altLang="en-US" sz="2133" dirty="0">
-              <a:solidFill>
-                <a:srgbClr val="C4E3B0"/>
-              </a:solidFill>
-              <a:ea typeface="Times New Roman" panose="02020603050405020304" pitchFamily="18" charset="0"/>
-            </a:endParaRPr>
-          </a:p>
-          <a:p>
-            <a:pPr lvl="1" eaLnBrk="0" fontAlgn="base" hangingPunct="0">
-              <a:spcBef>
-                <a:spcPct val="0"/>
-              </a:spcBef>
-              <a:spcAft>
-                <a:spcPct val="0"/>
-              </a:spcAft>
-            </a:pPr>
-            <a:endParaRPr lang="en-US" altLang="en-US" sz="2133" dirty="0">
-              <a:solidFill>
-                <a:srgbClr val="C4E3B0"/>
-              </a:solidFill>
-              <a:latin typeface="Arial" panose="020B0604020202020204" pitchFamily="34" charset="0"/>
-            </a:endParaRPr>
-          </a:p>
-        </p:txBody>
-      </p:sp>
-    </p:spTree>
-    <p:extLst>
-      <p:ext uri="{BB962C8B-B14F-4D97-AF65-F5344CB8AC3E}">
-        <p14:creationId xmlns:p14="http://schemas.microsoft.com/office/powerpoint/2010/main" val="2675055008"/>
-      </p:ext>
-    </p:extLst>
-  </p:cSld>
-  <p:clrMapOvr>
-    <a:masterClrMapping/>
-  </p:clrMapOvr>
-</p:sld>
-</file>
-
-<file path=ppt/slides/slide31.xml><?xml version="1.0" encoding="utf-8"?>
-<p:sld xmlns:a="http://schemas.openxmlformats.org/drawingml/2006/main" xmlns:r="http://schemas.openxmlformats.org/officeDocument/2006/relationships" xmlns:p="http://schemas.openxmlformats.org/presentationml/2006/main">
-  <p:cSld>
-    <p:spTree>
-      <p:nvGrpSpPr>
-        <p:cNvPr id="1" name=""/>
-        <p:cNvGrpSpPr/>
-        <p:nvPr/>
-      </p:nvGrpSpPr>
-      <p:grpSpPr>
-        <a:xfrm>
-          <a:off x="0" y="0"/>
-          <a:ext cx="0" cy="0"/>
-          <a:chOff x="0" y="0"/>
-          <a:chExt cx="0" cy="0"/>
-        </a:xfrm>
-      </p:grpSpPr>
-      <p:sp>
-        <p:nvSpPr>
           <p:cNvPr id="2" name="Title 1"/>
           <p:cNvSpPr>
             <a:spLocks noGrp="1"/>
@@ -16149,7 +15922,7 @@
 </p:sld>
 </file>
 
-<file path=ppt/slides/slide32.xml><?xml version="1.0" encoding="utf-8"?>
+<file path=ppt/slides/slide31.xml><?xml version="1.0" encoding="utf-8"?>
 <p:sld xmlns:a="http://schemas.openxmlformats.org/drawingml/2006/main" xmlns:r="http://schemas.openxmlformats.org/officeDocument/2006/relationships" xmlns:p="http://schemas.openxmlformats.org/presentationml/2006/main">
   <p:cSld>
     <p:spTree>
@@ -16209,7 +15982,7 @@
 </p:sld>
 </file>
 
-<file path=ppt/slides/slide33.xml><?xml version="1.0" encoding="utf-8"?>
+<file path=ppt/slides/slide32.xml><?xml version="1.0" encoding="utf-8"?>
 <p:sld xmlns:a="http://schemas.openxmlformats.org/drawingml/2006/main" xmlns:r="http://schemas.openxmlformats.org/officeDocument/2006/relationships" xmlns:p="http://schemas.openxmlformats.org/presentationml/2006/main">
   <p:cSld>
     <p:spTree>
@@ -16810,7 +16583,7 @@
 </p:sld>
 </file>
 
-<file path=ppt/slides/slide34.xml><?xml version="1.0" encoding="utf-8"?>
+<file path=ppt/slides/slide33.xml><?xml version="1.0" encoding="utf-8"?>
 <p:sld xmlns:a="http://schemas.openxmlformats.org/drawingml/2006/main" xmlns:r="http://schemas.openxmlformats.org/officeDocument/2006/relationships" xmlns:p="http://schemas.openxmlformats.org/presentationml/2006/main">
   <p:cSld>
     <p:spTree>
@@ -17411,7 +17184,7 @@
 </p:sld>
 </file>
 
-<file path=ppt/slides/slide35.xml><?xml version="1.0" encoding="utf-8"?>
+<file path=ppt/slides/slide34.xml><?xml version="1.0" encoding="utf-8"?>
 <p:sld xmlns:a="http://schemas.openxmlformats.org/drawingml/2006/main" xmlns:r="http://schemas.openxmlformats.org/officeDocument/2006/relationships" xmlns:p="http://schemas.openxmlformats.org/presentationml/2006/main">
   <p:cSld>
     <p:spTree>
@@ -17480,7 +17253,7 @@
 </p:sld>
 </file>
 
-<file path=ppt/slides/slide36.xml><?xml version="1.0" encoding="utf-8"?>
+<file path=ppt/slides/slide35.xml><?xml version="1.0" encoding="utf-8"?>
 <p:sld xmlns:a="http://schemas.openxmlformats.org/drawingml/2006/main" xmlns:r="http://schemas.openxmlformats.org/officeDocument/2006/relationships" xmlns:p="http://schemas.openxmlformats.org/presentationml/2006/main">
   <p:cSld>
     <p:spTree>
@@ -17775,7 +17548,7 @@
 </p:sld>
 </file>
 
-<file path=ppt/slides/slide37.xml><?xml version="1.0" encoding="utf-8"?>
+<file path=ppt/slides/slide36.xml><?xml version="1.0" encoding="utf-8"?>
 <p:sld xmlns:a="http://schemas.openxmlformats.org/drawingml/2006/main" xmlns:r="http://schemas.openxmlformats.org/officeDocument/2006/relationships" xmlns:p="http://schemas.openxmlformats.org/presentationml/2006/main">
   <p:cSld>
     <p:spTree>
@@ -18015,7 +17788,7 @@
 </p:sld>
 </file>
 
-<file path=ppt/slides/slide38.xml><?xml version="1.0" encoding="utf-8"?>
+<file path=ppt/slides/slide37.xml><?xml version="1.0" encoding="utf-8"?>
 <p:sld xmlns:a="http://schemas.openxmlformats.org/drawingml/2006/main" xmlns:r="http://schemas.openxmlformats.org/officeDocument/2006/relationships" xmlns:p="http://schemas.openxmlformats.org/presentationml/2006/main">
   <p:cSld>
     <p:spTree>
@@ -18084,13 +17857,13 @@
         </p:nvSpPr>
         <p:spPr>
           <a:xfrm>
-            <a:off x="2453268" y="1137831"/>
-            <a:ext cx="9230731" cy="3902520"/>
+            <a:off x="2435704" y="1137830"/>
+            <a:ext cx="9248296" cy="4316201"/>
           </a:xfrm>
         </p:spPr>
         <p:txBody>
           <a:bodyPr>
-            <a:normAutofit fontScale="92500" lnSpcReduction="20000"/>
+            <a:normAutofit fontScale="85000" lnSpcReduction="20000"/>
           </a:bodyPr>
           <a:lstStyle/>
           <a:p>
@@ -18124,7 +17897,7 @@
                 <a:latin typeface="Arial" panose="020B0604020202020204" pitchFamily="34" charset="0"/>
                 <a:cs typeface="Arial" panose="020B0604020202020204" pitchFamily="34" charset="0"/>
               </a:rPr>
-              <a:t>componentWillMount</a:t>
+              <a:t>componentDidMount</a:t>
             </a:r>
             <a:r>
               <a:rPr lang="en-US" sz="2800" dirty="0">
@@ -18255,8 +18028,39 @@
                 <a:latin typeface="Arial" panose="020B0604020202020204" pitchFamily="34" charset="0"/>
                 <a:cs typeface="Arial" panose="020B0604020202020204" pitchFamily="34" charset="0"/>
               </a:rPr>
-              <a:t> prop call to a regular variable.</a:t>
-            </a:r>
+              <a:t> prop call to a regular variable.  The post endpoint is the GET endpoint with the ‘s’ removed: </a:t>
+            </a:r>
+            <a:r>
+              <a:rPr lang="en-US" sz="2800" dirty="0">
+                <a:solidFill>
+                  <a:schemeClr val="accent2"/>
+                </a:solidFill>
+                <a:latin typeface="Arial" panose="020B0604020202020204" pitchFamily="34" charset="0"/>
+                <a:cs typeface="Arial" panose="020B0604020202020204" pitchFamily="34" charset="0"/>
+                <a:hlinkClick r:id="rId3">
+                  <a:extLst>
+                    <a:ext uri="{A12FA001-AC4F-418D-AE19-62706E023703}">
+                      <ahyp:hlinkClr xmlns:ahyp="http://schemas.microsoft.com/office/drawing/2018/hyperlinkcolor" val="tx"/>
+                    </a:ext>
+                  </a:extLst>
+                </a:hlinkClick>
+              </a:rPr>
+              <a:t>https://developer-service-overspeedy-celebratedness.cfapps.io/developer</a:t>
+            </a:r>
+            <a:r>
+              <a:rPr lang="en-US" sz="2800" dirty="0">
+                <a:solidFill>
+                  <a:schemeClr val="accent2"/>
+                </a:solidFill>
+                <a:latin typeface="Arial" panose="020B0604020202020204" pitchFamily="34" charset="0"/>
+                <a:cs typeface="Arial" panose="020B0604020202020204" pitchFamily="34" charset="0"/>
+              </a:rPr>
+              <a:t> </a:t>
+            </a:r>
+            <a:endParaRPr lang="en-US" sz="2800" dirty="0">
+              <a:latin typeface="Arial" panose="020B0604020202020204" pitchFamily="34" charset="0"/>
+              <a:cs typeface="Arial" panose="020B0604020202020204" pitchFamily="34" charset="0"/>
+            </a:endParaRPr>
           </a:p>
           <a:p>
             <a:pPr marL="742950" indent="-742950">
@@ -18367,7 +18171,7 @@
           <p:nvPr/>
         </p:nvPicPr>
         <p:blipFill>
-          <a:blip r:embed="rId3" cstate="print">
+          <a:blip r:embed="rId4" cstate="print">
             <a:extLst>
               <a:ext uri="{28A0092B-C50C-407E-A947-70E740481C1C}">
                 <a14:useLocalDpi xmlns:a14="http://schemas.microsoft.com/office/drawing/2010/main" val="0"/>
@@ -18617,7 +18421,7 @@
 </p:sld>
 </file>
 
-<file path=ppt/slides/slide39.xml><?xml version="1.0" encoding="utf-8"?>
+<file path=ppt/slides/slide38.xml><?xml version="1.0" encoding="utf-8"?>
 <p:sld xmlns:a="http://schemas.openxmlformats.org/drawingml/2006/main" xmlns:r="http://schemas.openxmlformats.org/officeDocument/2006/relationships" xmlns:p="http://schemas.openxmlformats.org/presentationml/2006/main">
   <p:cSld>
     <p:spTree>
@@ -18670,10 +18474,10 @@
       </p:sp>
       <p:pic>
         <p:nvPicPr>
-          <p:cNvPr id="5" name="Picture 4">
+          <p:cNvPr id="3" name="Picture 2">
             <a:extLst>
               <a:ext uri="{FF2B5EF4-FFF2-40B4-BE49-F238E27FC236}">
-                <a16:creationId xmlns:a16="http://schemas.microsoft.com/office/drawing/2014/main" id="{728232EC-2B67-E94D-9A68-139F3DF24467}"/>
+                <a16:creationId xmlns:a16="http://schemas.microsoft.com/office/drawing/2014/main" id="{41AE508D-D072-F343-B936-A8A40A93557B}"/>
               </a:ext>
             </a:extLst>
           </p:cNvPr>
@@ -18690,8 +18494,8 @@
         </p:blipFill>
         <p:spPr>
           <a:xfrm>
-            <a:off x="1424458" y="937520"/>
-            <a:ext cx="9332873" cy="5863373"/>
+            <a:off x="1340870" y="1154846"/>
+            <a:ext cx="9500049" cy="5703154"/>
           </a:xfrm>
           <a:prstGeom prst="rect">
             <a:avLst/>
@@ -18711,121 +18515,7 @@
 </p:sld>
 </file>
 
-<file path=ppt/slides/slide4.xml><?xml version="1.0" encoding="utf-8"?>
-<p:sld xmlns:a="http://schemas.openxmlformats.org/drawingml/2006/main" xmlns:r="http://schemas.openxmlformats.org/officeDocument/2006/relationships" xmlns:p="http://schemas.openxmlformats.org/presentationml/2006/main">
-  <p:cSld>
-    <p:spTree>
-      <p:nvGrpSpPr>
-        <p:cNvPr id="1" name=""/>
-        <p:cNvGrpSpPr/>
-        <p:nvPr/>
-      </p:nvGrpSpPr>
-      <p:grpSpPr>
-        <a:xfrm>
-          <a:off x="0" y="0"/>
-          <a:ext cx="0" cy="0"/>
-          <a:chOff x="0" y="0"/>
-          <a:chExt cx="0" cy="0"/>
-        </a:xfrm>
-      </p:grpSpPr>
-      <p:sp>
-        <p:nvSpPr>
-          <p:cNvPr id="10" name="Rectangle 9"/>
-          <p:cNvSpPr/>
-          <p:nvPr/>
-        </p:nvSpPr>
-        <p:spPr>
-          <a:xfrm>
-            <a:off x="1756779" y="1530752"/>
-            <a:ext cx="8521540" cy="3662990"/>
-          </a:xfrm>
-          <a:prstGeom prst="rect">
-            <a:avLst/>
-          </a:prstGeom>
-        </p:spPr>
-        <p:txBody>
-          <a:bodyPr wrap="square">
-            <a:spAutoFit/>
-          </a:bodyPr>
-          <a:lstStyle/>
-          <a:p>
-            <a:pPr algn="ctr">
-              <a:spcAft>
-                <a:spcPts val="1600"/>
-              </a:spcAft>
-            </a:pPr>
-            <a:r>
-              <a:rPr lang="en-US" sz="3200" b="1" dirty="0">
-                <a:solidFill>
-                  <a:schemeClr val="bg1">
-                    <a:lumMod val="85000"/>
-                  </a:schemeClr>
-                </a:solidFill>
-              </a:rPr>
-              <a:t>Benefits</a:t>
-            </a:r>
-          </a:p>
-          <a:p>
-            <a:pPr marL="685749" indent="-228594">
-              <a:buFont typeface="Arial" panose="020B0604020202020204" pitchFamily="34" charset="0"/>
-              <a:buChar char="•"/>
-            </a:pPr>
-            <a:r>
-              <a:rPr lang="en-US" sz="2667" dirty="0">
-                <a:solidFill>
-                  <a:srgbClr val="C4E3B0"/>
-                </a:solidFill>
-              </a:rPr>
-              <a:t>Must-know for React development</a:t>
-            </a:r>
-          </a:p>
-          <a:p>
-            <a:pPr marL="685749" indent="-228594">
-              <a:buFont typeface="Arial" panose="020B0604020202020204" pitchFamily="34" charset="0"/>
-              <a:buChar char="•"/>
-            </a:pPr>
-            <a:r>
-              <a:rPr lang="en-US" sz="2667" dirty="0">
-                <a:solidFill>
-                  <a:srgbClr val="C4E3B0"/>
-                </a:solidFill>
-              </a:rPr>
-              <a:t>Routing helps preserve state, browser history functionality</a:t>
-            </a:r>
-          </a:p>
-          <a:p>
-            <a:pPr marL="685749" indent="-228594">
-              <a:buFont typeface="Arial" panose="020B0604020202020204" pitchFamily="34" charset="0"/>
-              <a:buChar char="•"/>
-            </a:pPr>
-            <a:r>
-              <a:rPr lang="en-US" sz="2667" dirty="0">
-                <a:solidFill>
-                  <a:srgbClr val="C4E3B0"/>
-                </a:solidFill>
-              </a:rPr>
-              <a:t>Lifecycle methods are key to getting “in the middle” of a page’s rendering so that asynchronous events can be orchestrated such as accessing an API and using the results</a:t>
-            </a:r>
-          </a:p>
-        </p:txBody>
-      </p:sp>
-    </p:spTree>
-    <p:custDataLst>
-      <p:tags r:id="rId1"/>
-    </p:custDataLst>
-    <p:extLst>
-      <p:ext uri="{BB962C8B-B14F-4D97-AF65-F5344CB8AC3E}">
-        <p14:creationId xmlns:p14="http://schemas.microsoft.com/office/powerpoint/2010/main" val="819693354"/>
-      </p:ext>
-    </p:extLst>
-  </p:cSld>
-  <p:clrMapOvr>
-    <a:masterClrMapping/>
-  </p:clrMapOvr>
-</p:sld>
-</file>
-
-<file path=ppt/slides/slide40.xml><?xml version="1.0" encoding="utf-8"?>
+<file path=ppt/slides/slide39.xml><?xml version="1.0" encoding="utf-8"?>
 <p:sld xmlns:a="http://schemas.openxmlformats.org/drawingml/2006/main" xmlns:r="http://schemas.openxmlformats.org/officeDocument/2006/relationships" xmlns:p="http://schemas.openxmlformats.org/presentationml/2006/main">
   <p:cSld>
     <p:spTree>
@@ -18919,7 +18609,7 @@
 </p:sld>
 </file>
 
-<file path=ppt/slides/slide41.xml><?xml version="1.0" encoding="utf-8"?>
+<file path=ppt/slides/slide4.xml><?xml version="1.0" encoding="utf-8"?>
 <p:sld xmlns:a="http://schemas.openxmlformats.org/drawingml/2006/main" xmlns:r="http://schemas.openxmlformats.org/officeDocument/2006/relationships" xmlns:p="http://schemas.openxmlformats.org/presentationml/2006/main">
   <p:cSld>
     <p:spTree>
@@ -18938,6 +18628,120 @@
       </p:grpSpPr>
       <p:sp>
         <p:nvSpPr>
+          <p:cNvPr id="10" name="Rectangle 9"/>
+          <p:cNvSpPr/>
+          <p:nvPr/>
+        </p:nvSpPr>
+        <p:spPr>
+          <a:xfrm>
+            <a:off x="1756779" y="1530752"/>
+            <a:ext cx="8521540" cy="3662990"/>
+          </a:xfrm>
+          <a:prstGeom prst="rect">
+            <a:avLst/>
+          </a:prstGeom>
+        </p:spPr>
+        <p:txBody>
+          <a:bodyPr wrap="square">
+            <a:spAutoFit/>
+          </a:bodyPr>
+          <a:lstStyle/>
+          <a:p>
+            <a:pPr algn="ctr">
+              <a:spcAft>
+                <a:spcPts val="1600"/>
+              </a:spcAft>
+            </a:pPr>
+            <a:r>
+              <a:rPr lang="en-US" sz="3200" b="1" dirty="0">
+                <a:solidFill>
+                  <a:schemeClr val="bg1">
+                    <a:lumMod val="85000"/>
+                  </a:schemeClr>
+                </a:solidFill>
+              </a:rPr>
+              <a:t>Benefits</a:t>
+            </a:r>
+          </a:p>
+          <a:p>
+            <a:pPr marL="685749" indent="-228594">
+              <a:buFont typeface="Arial" panose="020B0604020202020204" pitchFamily="34" charset="0"/>
+              <a:buChar char="•"/>
+            </a:pPr>
+            <a:r>
+              <a:rPr lang="en-US" sz="2667" dirty="0">
+                <a:solidFill>
+                  <a:srgbClr val="C4E3B0"/>
+                </a:solidFill>
+              </a:rPr>
+              <a:t>Must-know for React development</a:t>
+            </a:r>
+          </a:p>
+          <a:p>
+            <a:pPr marL="685749" indent="-228594">
+              <a:buFont typeface="Arial" panose="020B0604020202020204" pitchFamily="34" charset="0"/>
+              <a:buChar char="•"/>
+            </a:pPr>
+            <a:r>
+              <a:rPr lang="en-US" sz="2667" dirty="0">
+                <a:solidFill>
+                  <a:srgbClr val="C4E3B0"/>
+                </a:solidFill>
+              </a:rPr>
+              <a:t>Routing helps preserve state, browser history functionality</a:t>
+            </a:r>
+          </a:p>
+          <a:p>
+            <a:pPr marL="685749" indent="-228594">
+              <a:buFont typeface="Arial" panose="020B0604020202020204" pitchFamily="34" charset="0"/>
+              <a:buChar char="•"/>
+            </a:pPr>
+            <a:r>
+              <a:rPr lang="en-US" sz="2667" dirty="0">
+                <a:solidFill>
+                  <a:srgbClr val="C4E3B0"/>
+                </a:solidFill>
+              </a:rPr>
+              <a:t>Lifecycle methods are key to getting “in the middle” of a page’s rendering so that asynchronous events can be orchestrated such as accessing an API and using the results</a:t>
+            </a:r>
+          </a:p>
+        </p:txBody>
+      </p:sp>
+    </p:spTree>
+    <p:custDataLst>
+      <p:tags r:id="rId1"/>
+    </p:custDataLst>
+    <p:extLst>
+      <p:ext uri="{BB962C8B-B14F-4D97-AF65-F5344CB8AC3E}">
+        <p14:creationId xmlns:p14="http://schemas.microsoft.com/office/powerpoint/2010/main" val="819693354"/>
+      </p:ext>
+    </p:extLst>
+  </p:cSld>
+  <p:clrMapOvr>
+    <a:masterClrMapping/>
+  </p:clrMapOvr>
+</p:sld>
+</file>
+
+<file path=ppt/slides/slide40.xml><?xml version="1.0" encoding="utf-8"?>
+<p:sld xmlns:a="http://schemas.openxmlformats.org/drawingml/2006/main" xmlns:r="http://schemas.openxmlformats.org/officeDocument/2006/relationships" xmlns:p="http://schemas.openxmlformats.org/presentationml/2006/main">
+  <p:cSld>
+    <p:spTree>
+      <p:nvGrpSpPr>
+        <p:cNvPr id="1" name=""/>
+        <p:cNvGrpSpPr/>
+        <p:nvPr/>
+      </p:nvGrpSpPr>
+      <p:grpSpPr>
+        <a:xfrm>
+          <a:off x="0" y="0"/>
+          <a:ext cx="0" cy="0"/>
+          <a:chOff x="0" y="0"/>
+          <a:chExt cx="0" cy="0"/>
+        </a:xfrm>
+      </p:grpSpPr>
+      <p:sp>
+        <p:nvSpPr>
           <p:cNvPr id="8" name="Title 7"/>
           <p:cNvSpPr>
             <a:spLocks noGrp="1"/>
@@ -19094,7 +18898,7 @@
 </p:sld>
 </file>
 
-<file path=ppt/slides/slide42.xml><?xml version="1.0" encoding="utf-8"?>
+<file path=ppt/slides/slide41.xml><?xml version="1.0" encoding="utf-8"?>
 <p:sld xmlns:a="http://schemas.openxmlformats.org/drawingml/2006/main" xmlns:r="http://schemas.openxmlformats.org/officeDocument/2006/relationships" xmlns:p="http://schemas.openxmlformats.org/presentationml/2006/main">
   <p:cSld>
     <p:spTree>
@@ -19585,7 +19389,7 @@
 </p:sld>
 </file>
 
-<file path=ppt/slides/slide43.xml><?xml version="1.0" encoding="utf-8"?>
+<file path=ppt/slides/slide42.xml><?xml version="1.0" encoding="utf-8"?>
 <p:sld xmlns:a="http://schemas.openxmlformats.org/drawingml/2006/main" xmlns:r="http://schemas.openxmlformats.org/officeDocument/2006/relationships" xmlns:p="http://schemas.openxmlformats.org/presentationml/2006/main">
   <p:cSld>
     <p:spTree>
@@ -20095,7 +19899,7 @@
 </p:sld>
 </file>
 
-<file path=ppt/slides/slide44.xml><?xml version="1.0" encoding="utf-8"?>
+<file path=ppt/slides/slide43.xml><?xml version="1.0" encoding="utf-8"?>
 <p:sld xmlns:a="http://schemas.openxmlformats.org/drawingml/2006/main" xmlns:r="http://schemas.openxmlformats.org/officeDocument/2006/relationships" xmlns:p="http://schemas.openxmlformats.org/presentationml/2006/main">
   <p:cSld>
     <p:spTree>
@@ -20513,7 +20317,7 @@
 </p:sld>
 </file>
 
-<file path=ppt/slides/slide45.xml><?xml version="1.0" encoding="utf-8"?>
+<file path=ppt/slides/slide44.xml><?xml version="1.0" encoding="utf-8"?>
 <p:sld xmlns:a="http://schemas.openxmlformats.org/drawingml/2006/main" xmlns:r="http://schemas.openxmlformats.org/officeDocument/2006/relationships" xmlns:p="http://schemas.openxmlformats.org/presentationml/2006/main">
   <p:cSld>
     <p:bg>
@@ -20852,7 +20656,7 @@
 </p:sld>
 </file>
 
-<file path=ppt/slides/slide46.xml><?xml version="1.0" encoding="utf-8"?>
+<file path=ppt/slides/slide45.xml><?xml version="1.0" encoding="utf-8"?>
 <p:sld xmlns:a="http://schemas.openxmlformats.org/drawingml/2006/main" xmlns:r="http://schemas.openxmlformats.org/officeDocument/2006/relationships" xmlns:p="http://schemas.openxmlformats.org/presentationml/2006/main">
   <p:cSld>
     <p:spTree>
@@ -20969,7 +20773,7 @@
 </p:sld>
 </file>
 
-<file path=ppt/slides/slide47.xml><?xml version="1.0" encoding="utf-8"?>
+<file path=ppt/slides/slide46.xml><?xml version="1.0" encoding="utf-8"?>
 <p:sld xmlns:a="http://schemas.openxmlformats.org/drawingml/2006/main" xmlns:r="http://schemas.openxmlformats.org/officeDocument/2006/relationships" xmlns:p="http://schemas.openxmlformats.org/presentationml/2006/main">
   <p:cSld>
     <p:bg>
@@ -21051,7 +20855,7 @@
 </p:sld>
 </file>
 
-<file path=ppt/slides/slide48.xml><?xml version="1.0" encoding="utf-8"?>
+<file path=ppt/slides/slide47.xml><?xml version="1.0" encoding="utf-8"?>
 <p:sld xmlns:a="http://schemas.openxmlformats.org/drawingml/2006/main" xmlns:r="http://schemas.openxmlformats.org/officeDocument/2006/relationships" xmlns:p="http://schemas.openxmlformats.org/presentationml/2006/main">
   <p:cSld>
     <p:spTree>

</xml_diff>

<commit_message>
updated to GCP backing service
</commit_message>
<xml_diff>
--- a/04 React Routing, Component Lifecycle Methods.pptx
+++ b/04 React Routing, Component Lifecycle Methods.pptx
@@ -246,7 +246,7 @@
           <a:p>
             <a:fld id="{B376EE29-1A90-1146-96FE-FD5979F1AFC2}" type="datetimeFigureOut">
               <a:rPr lang="en-US" smtClean="0"/>
-              <a:t>4/27/20</a:t>
+              <a:t>5/28/20</a:t>
             </a:fld>
             <a:endParaRPr lang="en-US"/>
           </a:p>
@@ -3269,7 +3269,7 @@
           <a:p>
             <a:fld id="{FAC8553D-62A4-B94A-B303-E17560B89933}" type="datetimeFigureOut">
               <a:rPr lang="en-US" smtClean="0"/>
-              <a:t>4/27/20</a:t>
+              <a:t>5/28/20</a:t>
             </a:fld>
             <a:endParaRPr lang="en-US"/>
           </a:p>
@@ -3467,7 +3467,7 @@
           <a:p>
             <a:fld id="{FAC8553D-62A4-B94A-B303-E17560B89933}" type="datetimeFigureOut">
               <a:rPr lang="en-US" smtClean="0"/>
-              <a:t>4/27/20</a:t>
+              <a:t>5/28/20</a:t>
             </a:fld>
             <a:endParaRPr lang="en-US"/>
           </a:p>
@@ -3675,7 +3675,7 @@
           <a:p>
             <a:fld id="{FAC8553D-62A4-B94A-B303-E17560B89933}" type="datetimeFigureOut">
               <a:rPr lang="en-US" smtClean="0"/>
-              <a:t>4/27/20</a:t>
+              <a:t>5/28/20</a:t>
             </a:fld>
             <a:endParaRPr lang="en-US"/>
           </a:p>
@@ -6307,7 +6307,7 @@
           <a:p>
             <a:fld id="{FAC8553D-62A4-B94A-B303-E17560B89933}" type="datetimeFigureOut">
               <a:rPr lang="en-US" smtClean="0"/>
-              <a:t>4/27/20</a:t>
+              <a:t>5/28/20</a:t>
             </a:fld>
             <a:endParaRPr lang="en-US"/>
           </a:p>
@@ -7048,7 +7048,7 @@
           <a:p>
             <a:fld id="{FAC8553D-62A4-B94A-B303-E17560B89933}" type="datetimeFigureOut">
               <a:rPr lang="en-US" smtClean="0"/>
-              <a:t>4/27/20</a:t>
+              <a:t>5/28/20</a:t>
             </a:fld>
             <a:endParaRPr lang="en-US"/>
           </a:p>
@@ -7313,7 +7313,7 @@
           <a:p>
             <a:fld id="{FAC8553D-62A4-B94A-B303-E17560B89933}" type="datetimeFigureOut">
               <a:rPr lang="en-US" smtClean="0"/>
-              <a:t>4/27/20</a:t>
+              <a:t>5/28/20</a:t>
             </a:fld>
             <a:endParaRPr lang="en-US"/>
           </a:p>
@@ -7725,7 +7725,7 @@
           <a:p>
             <a:fld id="{FAC8553D-62A4-B94A-B303-E17560B89933}" type="datetimeFigureOut">
               <a:rPr lang="en-US" smtClean="0"/>
-              <a:t>4/27/20</a:t>
+              <a:t>5/28/20</a:t>
             </a:fld>
             <a:endParaRPr lang="en-US"/>
           </a:p>
@@ -7866,7 +7866,7 @@
           <a:p>
             <a:fld id="{FAC8553D-62A4-B94A-B303-E17560B89933}" type="datetimeFigureOut">
               <a:rPr lang="en-US" smtClean="0"/>
-              <a:t>4/27/20</a:t>
+              <a:t>5/28/20</a:t>
             </a:fld>
             <a:endParaRPr lang="en-US"/>
           </a:p>
@@ -7979,7 +7979,7 @@
           <a:p>
             <a:fld id="{FAC8553D-62A4-B94A-B303-E17560B89933}" type="datetimeFigureOut">
               <a:rPr lang="en-US" smtClean="0"/>
-              <a:t>4/27/20</a:t>
+              <a:t>5/28/20</a:t>
             </a:fld>
             <a:endParaRPr lang="en-US"/>
           </a:p>
@@ -8290,7 +8290,7 @@
           <a:p>
             <a:fld id="{FAC8553D-62A4-B94A-B303-E17560B89933}" type="datetimeFigureOut">
               <a:rPr lang="en-US" smtClean="0"/>
-              <a:t>4/27/20</a:t>
+              <a:t>5/28/20</a:t>
             </a:fld>
             <a:endParaRPr lang="en-US"/>
           </a:p>
@@ -8578,7 +8578,7 @@
           <a:p>
             <a:fld id="{FAC8553D-62A4-B94A-B303-E17560B89933}" type="datetimeFigureOut">
               <a:rPr lang="en-US" smtClean="0"/>
-              <a:t>4/27/20</a:t>
+              <a:t>5/28/20</a:t>
             </a:fld>
             <a:endParaRPr lang="en-US"/>
           </a:p>
@@ -8831,7 +8831,7 @@
           <a:p>
             <a:fld id="{FAC8553D-62A4-B94A-B303-E17560B89933}" type="datetimeFigureOut">
               <a:rPr lang="en-US" smtClean="0"/>
-              <a:t>4/27/20</a:t>
+              <a:t>5/28/20</a:t>
             </a:fld>
             <a:endParaRPr lang="en-US"/>
           </a:p>
@@ -17921,7 +17921,7 @@
                   </a:extLst>
                 </a:hlinkClick>
               </a:rPr>
-              <a:t>https://developer-service-overspeedy-celebratedness.cfapps.io/developers</a:t>
+              <a:t>https://tech-services-1000201953.uc.r.appspot.com/developers</a:t>
             </a:r>
             <a:r>
               <a:rPr lang="en-US" sz="2800" dirty="0">
@@ -18037,7 +18037,7 @@
                 </a:solidFill>
                 <a:latin typeface="Arial" panose="020B0604020202020204" pitchFamily="34" charset="0"/>
                 <a:cs typeface="Arial" panose="020B0604020202020204" pitchFamily="34" charset="0"/>
-                <a:hlinkClick r:id="rId3">
+                <a:hlinkClick r:id="rId2">
                   <a:extLst>
                     <a:ext uri="{A12FA001-AC4F-418D-AE19-62706E023703}">
                       <ahyp:hlinkClr xmlns:ahyp="http://schemas.microsoft.com/office/drawing/2018/hyperlinkcolor" val="tx"/>
@@ -18045,17 +18045,7 @@
                   </a:extLst>
                 </a:hlinkClick>
               </a:rPr>
-              <a:t>https://developer-service-overspeedy-celebratedness.cfapps.io/developer</a:t>
-            </a:r>
-            <a:r>
-              <a:rPr lang="en-US" sz="2800" dirty="0">
-                <a:solidFill>
-                  <a:schemeClr val="accent2"/>
-                </a:solidFill>
-                <a:latin typeface="Arial" panose="020B0604020202020204" pitchFamily="34" charset="0"/>
-                <a:cs typeface="Arial" panose="020B0604020202020204" pitchFamily="34" charset="0"/>
-              </a:rPr>
-              <a:t> </a:t>
+              <a:t>https://tech-services-1000201953.uc.r.appspot.com/developer</a:t>
             </a:r>
             <a:endParaRPr lang="en-US" sz="2800" dirty="0">
               <a:latin typeface="Arial" panose="020B0604020202020204" pitchFamily="34" charset="0"/>
@@ -18171,7 +18161,7 @@
           <p:nvPr/>
         </p:nvPicPr>
         <p:blipFill>
-          <a:blip r:embed="rId4" cstate="print">
+          <a:blip r:embed="rId3" cstate="print">
             <a:extLst>
               <a:ext uri="{28A0092B-C50C-407E-A947-70E740481C1C}">
                 <a14:useLocalDpi xmlns:a14="http://schemas.microsoft.com/office/drawing/2010/main" val="0"/>
@@ -18474,10 +18464,10 @@
       </p:sp>
       <p:pic>
         <p:nvPicPr>
-          <p:cNvPr id="3" name="Picture 2">
+          <p:cNvPr id="4" name="Picture 3">
             <a:extLst>
               <a:ext uri="{FF2B5EF4-FFF2-40B4-BE49-F238E27FC236}">
-                <a16:creationId xmlns:a16="http://schemas.microsoft.com/office/drawing/2014/main" id="{41AE508D-D072-F343-B936-A8A40A93557B}"/>
+                <a16:creationId xmlns:a16="http://schemas.microsoft.com/office/drawing/2014/main" id="{2F319586-56C8-0641-8E7D-48D6BBC9B69E}"/>
               </a:ext>
             </a:extLst>
           </p:cNvPr>
@@ -18494,8 +18484,8 @@
         </p:blipFill>
         <p:spPr>
           <a:xfrm>
-            <a:off x="1340870" y="1154846"/>
-            <a:ext cx="9500049" cy="5703154"/>
+            <a:off x="1859198" y="887537"/>
+            <a:ext cx="8463394" cy="5970463"/>
           </a:xfrm>
           <a:prstGeom prst="rect">
             <a:avLst/>
@@ -18568,10 +18558,10 @@
       </p:sp>
       <p:pic>
         <p:nvPicPr>
-          <p:cNvPr id="3" name="Picture 2">
+          <p:cNvPr id="4" name="Picture 3">
             <a:extLst>
               <a:ext uri="{FF2B5EF4-FFF2-40B4-BE49-F238E27FC236}">
-                <a16:creationId xmlns:a16="http://schemas.microsoft.com/office/drawing/2014/main" id="{8361B3DB-0293-1C4D-9ACE-AD92F75506C3}"/>
+                <a16:creationId xmlns:a16="http://schemas.microsoft.com/office/drawing/2014/main" id="{24CA3DEA-5211-2541-8764-6329E27C0A88}"/>
               </a:ext>
             </a:extLst>
           </p:cNvPr>
@@ -18588,8 +18578,8 @@
         </p:blipFill>
         <p:spPr>
           <a:xfrm>
-            <a:off x="419669" y="1041770"/>
-            <a:ext cx="11342451" cy="5656495"/>
+            <a:off x="984333" y="844132"/>
+            <a:ext cx="10213124" cy="6013868"/>
           </a:xfrm>
           <a:prstGeom prst="rect">
             <a:avLst/>

</xml_diff>